<commit_message>
Added web app slide to ppt
</commit_message>
<xml_diff>
--- a/Project Presentation.pptx
+++ b/Project Presentation.pptx
@@ -5,35 +5,35 @@
     <p:sldMasterId id="2147483648" r:id="rId1"/>
   </p:sldMasterIdLst>
   <p:sldIdLst>
-    <p:sldId id="256" r:id="rId3"/>
-    <p:sldId id="257" r:id="rId4"/>
-    <p:sldId id="259" r:id="rId5"/>
-    <p:sldId id="260" r:id="rId6"/>
-    <p:sldId id="261" r:id="rId7"/>
-    <p:sldId id="262" r:id="rId8"/>
-    <p:sldId id="263" r:id="rId9"/>
-    <p:sldId id="264" r:id="rId10"/>
-    <p:sldId id="265" r:id="rId11"/>
-    <p:sldId id="266" r:id="rId12"/>
-    <p:sldId id="267" r:id="rId13"/>
-    <p:sldId id="268" r:id="rId14"/>
-    <p:sldId id="269" r:id="rId15"/>
-    <p:sldId id="270" r:id="rId16"/>
-    <p:sldId id="273" r:id="rId17"/>
-    <p:sldId id="274" r:id="rId18"/>
-    <p:sldId id="275" r:id="rId19"/>
-    <p:sldId id="276" r:id="rId20"/>
-    <p:sldId id="277" r:id="rId21"/>
-    <p:sldId id="278" r:id="rId22"/>
-    <p:sldId id="279" r:id="rId23"/>
-    <p:sldId id="271" r:id="rId24"/>
-    <p:sldId id="280" r:id="rId25"/>
-    <p:sldId id="272" r:id="rId26"/>
-    <p:sldId id="281" r:id="rId27"/>
-    <p:sldId id="282" r:id="rId28"/>
+    <p:sldId id="256" r:id="rId2"/>
+    <p:sldId id="257" r:id="rId3"/>
+    <p:sldId id="259" r:id="rId4"/>
+    <p:sldId id="260" r:id="rId5"/>
+    <p:sldId id="261" r:id="rId6"/>
+    <p:sldId id="262" r:id="rId7"/>
+    <p:sldId id="263" r:id="rId8"/>
+    <p:sldId id="264" r:id="rId9"/>
+    <p:sldId id="265" r:id="rId10"/>
+    <p:sldId id="266" r:id="rId11"/>
+    <p:sldId id="267" r:id="rId12"/>
+    <p:sldId id="268" r:id="rId13"/>
+    <p:sldId id="269" r:id="rId14"/>
+    <p:sldId id="270" r:id="rId15"/>
+    <p:sldId id="273" r:id="rId16"/>
+    <p:sldId id="274" r:id="rId17"/>
+    <p:sldId id="275" r:id="rId18"/>
+    <p:sldId id="276" r:id="rId19"/>
+    <p:sldId id="277" r:id="rId20"/>
+    <p:sldId id="278" r:id="rId21"/>
+    <p:sldId id="279" r:id="rId22"/>
+    <p:sldId id="271" r:id="rId23"/>
+    <p:sldId id="280" r:id="rId24"/>
+    <p:sldId id="272" r:id="rId25"/>
+    <p:sldId id="281" r:id="rId26"/>
+    <p:sldId id="282" r:id="rId27"/>
   </p:sldIdLst>
   <p:sldSz cx="12192000" cy="6858000"/>
-  <p:notesSz cx="7103745" cy="10234295"/>
+  <p:notesSz cx="7104063" cy="10234613"/>
   <p:defaultTextStyle>
     <a:defPPr>
       <a:defRPr lang="zh-CN"/>
@@ -132,7 +132,7 @@
   <p:extLst>
     <p:ext uri="{521415D9-36F7-43E2-AB2F-B90AF26B5E84}">
       <p14:sectionLst xmlns:p14="http://schemas.microsoft.com/office/powerpoint/2010/main">
-        <p14:section name="默认节" id="{0012e513-945a-48ba-bd6b-6332c0c3d1d0}">
+        <p14:section name="默认节" id="{0012E513-945A-48BA-BD6B-6332C0C3D1D0}">
           <p14:sldIdLst>
             <p14:sldId id="256"/>
             <p14:sldId id="257"/>
@@ -149,6 +149,7 @@
             <p14:sldId id="269"/>
             <p14:sldId id="270"/>
             <p14:sldId id="273"/>
+            <p14:sldId id="274"/>
             <p14:sldId id="275"/>
             <p14:sldId id="276"/>
             <p14:sldId id="277"/>
@@ -159,10 +160,12 @@
             <p14:sldId id="272"/>
             <p14:sldId id="281"/>
             <p14:sldId id="282"/>
-            <p14:sldId id="274"/>
           </p14:sldIdLst>
         </p14:section>
       </p14:sectionLst>
+    </p:ext>
+    <p:ext uri="{EFAFB233-063F-42B5-8137-9DF3F51BA10A}">
+      <p15:sldGuideLst xmlns:p15="http://schemas.microsoft.com/office/powerpoint/2012/main"/>
     </p:ext>
   </p:extLst>
 </p:presentation>
@@ -299,6 +302,7 @@
           <a:p>
             <a:fld id="{82F288E0-7875-42C4-84C8-98DBBD3BF4D2}" type="datetimeFigureOut">
               <a:rPr lang="zh-CN" altLang="en-US" smtClean="0"/>
+              <a:t>2018/5/14</a:t>
             </a:fld>
             <a:endParaRPr lang="zh-CN" altLang="en-US"/>
           </a:p>
@@ -340,6 +344,7 @@
           <a:p>
             <a:fld id="{7D9BB5D0-35E4-459D-AEF3-FE4D7C45CC19}" type="slidenum">
               <a:rPr lang="zh-CN" altLang="en-US" smtClean="0"/>
+              <a:t>‹#›</a:t>
             </a:fld>
             <a:endParaRPr lang="zh-CN" altLang="en-US"/>
           </a:p>
@@ -395,7 +400,6 @@
               <a:rPr lang="zh-CN" altLang="en-US" smtClean="0"/>
               <a:t>单击此处编辑母版文本样式</a:t>
             </a:r>
-            <a:endParaRPr lang="zh-CN" altLang="en-US" smtClean="0"/>
           </a:p>
           <a:p>
             <a:pPr lvl="1"/>
@@ -403,7 +407,6 @@
               <a:rPr lang="zh-CN" altLang="en-US" smtClean="0"/>
               <a:t>第二级</a:t>
             </a:r>
-            <a:endParaRPr lang="zh-CN" altLang="en-US" smtClean="0"/>
           </a:p>
           <a:p>
             <a:pPr lvl="2"/>
@@ -411,7 +414,6 @@
               <a:rPr lang="zh-CN" altLang="en-US" smtClean="0"/>
               <a:t>第三级</a:t>
             </a:r>
-            <a:endParaRPr lang="zh-CN" altLang="en-US" smtClean="0"/>
           </a:p>
           <a:p>
             <a:pPr lvl="3"/>
@@ -419,7 +421,6 @@
               <a:rPr lang="zh-CN" altLang="en-US" smtClean="0"/>
               <a:t>第四级</a:t>
             </a:r>
-            <a:endParaRPr lang="zh-CN" altLang="en-US" smtClean="0"/>
           </a:p>
           <a:p>
             <a:pPr lvl="4"/>
@@ -448,6 +449,7 @@
           <a:p>
             <a:fld id="{82F288E0-7875-42C4-84C8-98DBBD3BF4D2}" type="datetimeFigureOut">
               <a:rPr lang="zh-CN" altLang="en-US" smtClean="0"/>
+              <a:t>2018/5/14</a:t>
             </a:fld>
             <a:endParaRPr lang="zh-CN" altLang="en-US"/>
           </a:p>
@@ -489,6 +491,7 @@
           <a:p>
             <a:fld id="{7D9BB5D0-35E4-459D-AEF3-FE4D7C45CC19}" type="slidenum">
               <a:rPr lang="zh-CN" altLang="en-US" smtClean="0"/>
+              <a:t>‹#›</a:t>
             </a:fld>
             <a:endParaRPr lang="zh-CN" altLang="en-US"/>
           </a:p>
@@ -562,7 +565,6 @@
               <a:rPr lang="zh-CN" altLang="en-US" smtClean="0"/>
               <a:t>单击此处编辑母版文本样式</a:t>
             </a:r>
-            <a:endParaRPr lang="zh-CN" altLang="en-US" smtClean="0"/>
           </a:p>
           <a:p>
             <a:pPr lvl="1"/>
@@ -570,7 +572,6 @@
               <a:rPr lang="zh-CN" altLang="en-US" smtClean="0"/>
               <a:t>第二级</a:t>
             </a:r>
-            <a:endParaRPr lang="zh-CN" altLang="en-US" smtClean="0"/>
           </a:p>
           <a:p>
             <a:pPr lvl="2"/>
@@ -578,7 +579,6 @@
               <a:rPr lang="zh-CN" altLang="en-US" smtClean="0"/>
               <a:t>第三级</a:t>
             </a:r>
-            <a:endParaRPr lang="zh-CN" altLang="en-US" smtClean="0"/>
           </a:p>
           <a:p>
             <a:pPr lvl="3"/>
@@ -586,7 +586,6 @@
               <a:rPr lang="zh-CN" altLang="en-US" smtClean="0"/>
               <a:t>第四级</a:t>
             </a:r>
-            <a:endParaRPr lang="zh-CN" altLang="en-US" smtClean="0"/>
           </a:p>
           <a:p>
             <a:pPr lvl="4"/>
@@ -615,6 +614,7 @@
           <a:p>
             <a:fld id="{82F288E0-7875-42C4-84C8-98DBBD3BF4D2}" type="datetimeFigureOut">
               <a:rPr lang="zh-CN" altLang="en-US" smtClean="0"/>
+              <a:t>2018/5/14</a:t>
             </a:fld>
             <a:endParaRPr lang="zh-CN" altLang="en-US"/>
           </a:p>
@@ -656,6 +656,7 @@
           <a:p>
             <a:fld id="{7D9BB5D0-35E4-459D-AEF3-FE4D7C45CC19}" type="slidenum">
               <a:rPr lang="zh-CN" altLang="en-US" smtClean="0"/>
+              <a:t>‹#›</a:t>
             </a:fld>
             <a:endParaRPr lang="zh-CN" altLang="en-US"/>
           </a:p>
@@ -834,7 +835,6 @@
               <a:rPr lang="zh-CN" altLang="en-US" smtClean="0"/>
               <a:t>单击此处编辑母版文本样式</a:t>
             </a:r>
-            <a:endParaRPr lang="zh-CN" altLang="en-US" smtClean="0"/>
           </a:p>
         </p:txBody>
       </p:sp>
@@ -855,6 +855,7 @@
           <a:p>
             <a:fld id="{82F288E0-7875-42C4-84C8-98DBBD3BF4D2}" type="datetimeFigureOut">
               <a:rPr lang="zh-CN" altLang="en-US" smtClean="0"/>
+              <a:t>2018/5/14</a:t>
             </a:fld>
             <a:endParaRPr lang="zh-CN" altLang="en-US"/>
           </a:p>
@@ -896,6 +897,7 @@
           <a:p>
             <a:fld id="{7D9BB5D0-35E4-459D-AEF3-FE4D7C45CC19}" type="slidenum">
               <a:rPr lang="zh-CN" altLang="en-US" smtClean="0"/>
+              <a:t>‹#›</a:t>
             </a:fld>
             <a:endParaRPr lang="zh-CN" altLang="en-US"/>
           </a:p>
@@ -974,7 +976,6 @@
               <a:rPr lang="zh-CN" altLang="en-US" smtClean="0"/>
               <a:t>单击此处编辑母版文本样式</a:t>
             </a:r>
-            <a:endParaRPr lang="zh-CN" altLang="en-US" smtClean="0"/>
           </a:p>
           <a:p>
             <a:pPr lvl="1"/>
@@ -982,7 +983,6 @@
               <a:rPr lang="zh-CN" altLang="en-US" smtClean="0"/>
               <a:t>第二级</a:t>
             </a:r>
-            <a:endParaRPr lang="zh-CN" altLang="en-US" smtClean="0"/>
           </a:p>
           <a:p>
             <a:pPr lvl="2"/>
@@ -990,7 +990,6 @@
               <a:rPr lang="zh-CN" altLang="en-US" smtClean="0"/>
               <a:t>第三级</a:t>
             </a:r>
-            <a:endParaRPr lang="zh-CN" altLang="en-US" smtClean="0"/>
           </a:p>
           <a:p>
             <a:pPr lvl="3"/>
@@ -998,7 +997,6 @@
               <a:rPr lang="zh-CN" altLang="en-US" smtClean="0"/>
               <a:t>第四级</a:t>
             </a:r>
-            <a:endParaRPr lang="zh-CN" altLang="en-US" smtClean="0"/>
           </a:p>
           <a:p>
             <a:pPr lvl="4"/>
@@ -1035,7 +1033,6 @@
               <a:rPr lang="zh-CN" altLang="en-US" smtClean="0"/>
               <a:t>单击此处编辑母版文本样式</a:t>
             </a:r>
-            <a:endParaRPr lang="zh-CN" altLang="en-US" smtClean="0"/>
           </a:p>
           <a:p>
             <a:pPr lvl="1"/>
@@ -1043,7 +1040,6 @@
               <a:rPr lang="zh-CN" altLang="en-US" smtClean="0"/>
               <a:t>第二级</a:t>
             </a:r>
-            <a:endParaRPr lang="zh-CN" altLang="en-US" smtClean="0"/>
           </a:p>
           <a:p>
             <a:pPr lvl="2"/>
@@ -1051,7 +1047,6 @@
               <a:rPr lang="zh-CN" altLang="en-US" smtClean="0"/>
               <a:t>第三级</a:t>
             </a:r>
-            <a:endParaRPr lang="zh-CN" altLang="en-US" smtClean="0"/>
           </a:p>
           <a:p>
             <a:pPr lvl="3"/>
@@ -1059,7 +1054,6 @@
               <a:rPr lang="zh-CN" altLang="en-US" smtClean="0"/>
               <a:t>第四级</a:t>
             </a:r>
-            <a:endParaRPr lang="zh-CN" altLang="en-US" smtClean="0"/>
           </a:p>
           <a:p>
             <a:pPr lvl="4"/>
@@ -1088,6 +1082,7 @@
           <a:p>
             <a:fld id="{82F288E0-7875-42C4-84C8-98DBBD3BF4D2}" type="datetimeFigureOut">
               <a:rPr lang="zh-CN" altLang="en-US" smtClean="0"/>
+              <a:t>2018/5/14</a:t>
             </a:fld>
             <a:endParaRPr lang="zh-CN" altLang="en-US"/>
           </a:p>
@@ -1129,6 +1124,7 @@
           <a:p>
             <a:fld id="{7D9BB5D0-35E4-459D-AEF3-FE4D7C45CC19}" type="slidenum">
               <a:rPr lang="zh-CN" altLang="en-US" smtClean="0"/>
+              <a:t>‹#›</a:t>
             </a:fld>
             <a:endParaRPr lang="zh-CN" altLang="en-US"/>
           </a:p>
@@ -1249,7 +1245,6 @@
               <a:rPr lang="zh-CN" altLang="en-US" smtClean="0"/>
               <a:t>单击此处编辑母版文本样式</a:t>
             </a:r>
-            <a:endParaRPr lang="zh-CN" altLang="en-US" smtClean="0"/>
           </a:p>
         </p:txBody>
       </p:sp>
@@ -1278,7 +1273,6 @@
               <a:rPr lang="zh-CN" altLang="en-US" smtClean="0"/>
               <a:t>单击此处编辑母版文本样式</a:t>
             </a:r>
-            <a:endParaRPr lang="zh-CN" altLang="en-US" smtClean="0"/>
           </a:p>
           <a:p>
             <a:pPr lvl="1"/>
@@ -1286,7 +1280,6 @@
               <a:rPr lang="zh-CN" altLang="en-US" smtClean="0"/>
               <a:t>第二级</a:t>
             </a:r>
-            <a:endParaRPr lang="zh-CN" altLang="en-US" smtClean="0"/>
           </a:p>
           <a:p>
             <a:pPr lvl="2"/>
@@ -1294,7 +1287,6 @@
               <a:rPr lang="zh-CN" altLang="en-US" smtClean="0"/>
               <a:t>第三级</a:t>
             </a:r>
-            <a:endParaRPr lang="zh-CN" altLang="en-US" smtClean="0"/>
           </a:p>
           <a:p>
             <a:pPr lvl="3"/>
@@ -1302,7 +1294,6 @@
               <a:rPr lang="zh-CN" altLang="en-US" smtClean="0"/>
               <a:t>第四级</a:t>
             </a:r>
-            <a:endParaRPr lang="zh-CN" altLang="en-US" smtClean="0"/>
           </a:p>
           <a:p>
             <a:pPr lvl="4"/>
@@ -1376,7 +1367,6 @@
               <a:rPr lang="zh-CN" altLang="en-US" smtClean="0"/>
               <a:t>单击此处编辑母版文本样式</a:t>
             </a:r>
-            <a:endParaRPr lang="zh-CN" altLang="en-US" smtClean="0"/>
           </a:p>
         </p:txBody>
       </p:sp>
@@ -1405,7 +1395,6 @@
               <a:rPr lang="zh-CN" altLang="en-US" smtClean="0"/>
               <a:t>单击此处编辑母版文本样式</a:t>
             </a:r>
-            <a:endParaRPr lang="zh-CN" altLang="en-US" smtClean="0"/>
           </a:p>
           <a:p>
             <a:pPr lvl="1"/>
@@ -1413,7 +1402,6 @@
               <a:rPr lang="zh-CN" altLang="en-US" smtClean="0"/>
               <a:t>第二级</a:t>
             </a:r>
-            <a:endParaRPr lang="zh-CN" altLang="en-US" smtClean="0"/>
           </a:p>
           <a:p>
             <a:pPr lvl="2"/>
@@ -1421,7 +1409,6 @@
               <a:rPr lang="zh-CN" altLang="en-US" smtClean="0"/>
               <a:t>第三级</a:t>
             </a:r>
-            <a:endParaRPr lang="zh-CN" altLang="en-US" smtClean="0"/>
           </a:p>
           <a:p>
             <a:pPr lvl="3"/>
@@ -1429,7 +1416,6 @@
               <a:rPr lang="zh-CN" altLang="en-US" smtClean="0"/>
               <a:t>第四级</a:t>
             </a:r>
-            <a:endParaRPr lang="zh-CN" altLang="en-US" smtClean="0"/>
           </a:p>
           <a:p>
             <a:pPr lvl="4"/>
@@ -1458,6 +1444,7 @@
           <a:p>
             <a:fld id="{82F288E0-7875-42C4-84C8-98DBBD3BF4D2}" type="datetimeFigureOut">
               <a:rPr lang="zh-CN" altLang="en-US" smtClean="0"/>
+              <a:t>2018/5/14</a:t>
             </a:fld>
             <a:endParaRPr lang="zh-CN" altLang="en-US"/>
           </a:p>
@@ -1499,6 +1486,7 @@
           <a:p>
             <a:fld id="{7D9BB5D0-35E4-459D-AEF3-FE4D7C45CC19}" type="slidenum">
               <a:rPr lang="zh-CN" altLang="en-US" smtClean="0"/>
+              <a:t>‹#›</a:t>
             </a:fld>
             <a:endParaRPr lang="zh-CN" altLang="en-US"/>
           </a:p>
@@ -1569,6 +1557,7 @@
           <a:p>
             <a:fld id="{82F288E0-7875-42C4-84C8-98DBBD3BF4D2}" type="datetimeFigureOut">
               <a:rPr lang="zh-CN" altLang="en-US" smtClean="0"/>
+              <a:t>2018/5/14</a:t>
             </a:fld>
             <a:endParaRPr lang="zh-CN" altLang="en-US"/>
           </a:p>
@@ -1610,6 +1599,7 @@
           <a:p>
             <a:fld id="{7D9BB5D0-35E4-459D-AEF3-FE4D7C45CC19}" type="slidenum">
               <a:rPr lang="zh-CN" altLang="en-US" smtClean="0"/>
+              <a:t>‹#›</a:t>
             </a:fld>
             <a:endParaRPr lang="zh-CN" altLang="en-US"/>
           </a:p>
@@ -1657,6 +1647,7 @@
           <a:p>
             <a:fld id="{82F288E0-7875-42C4-84C8-98DBBD3BF4D2}" type="datetimeFigureOut">
               <a:rPr lang="zh-CN" altLang="en-US" smtClean="0"/>
+              <a:t>2018/5/14</a:t>
             </a:fld>
             <a:endParaRPr lang="zh-CN" altLang="en-US"/>
           </a:p>
@@ -1698,6 +1689,7 @@
           <a:p>
             <a:fld id="{7D9BB5D0-35E4-459D-AEF3-FE4D7C45CC19}" type="slidenum">
               <a:rPr lang="zh-CN" altLang="en-US" smtClean="0"/>
+              <a:t>‹#›</a:t>
             </a:fld>
             <a:endParaRPr lang="zh-CN" altLang="en-US"/>
           </a:p>
@@ -1883,7 +1875,6 @@
               <a:rPr lang="zh-CN" altLang="en-US" smtClean="0"/>
               <a:t>单击此处编辑母版文本样式</a:t>
             </a:r>
-            <a:endParaRPr lang="zh-CN" altLang="en-US" smtClean="0"/>
           </a:p>
         </p:txBody>
       </p:sp>
@@ -1904,6 +1895,7 @@
           <a:p>
             <a:fld id="{82F288E0-7875-42C4-84C8-98DBBD3BF4D2}" type="datetimeFigureOut">
               <a:rPr lang="zh-CN" altLang="en-US" smtClean="0"/>
+              <a:t>2018/5/14</a:t>
             </a:fld>
             <a:endParaRPr lang="zh-CN" altLang="en-US"/>
           </a:p>
@@ -1945,6 +1937,7 @@
           <a:p>
             <a:fld id="{7D9BB5D0-35E4-459D-AEF3-FE4D7C45CC19}" type="slidenum">
               <a:rPr lang="zh-CN" altLang="en-US" smtClean="0"/>
+              <a:t>‹#›</a:t>
             </a:fld>
             <a:endParaRPr lang="zh-CN" altLang="en-US"/>
           </a:p>
@@ -2028,7 +2021,6 @@
               <a:rPr lang="zh-CN" altLang="en-US" smtClean="0"/>
               <a:t>单击此处编辑母版文本样式</a:t>
             </a:r>
-            <a:endParaRPr lang="zh-CN" altLang="en-US" smtClean="0"/>
           </a:p>
           <a:p>
             <a:pPr lvl="1"/>
@@ -2036,7 +2028,6 @@
               <a:rPr lang="zh-CN" altLang="en-US" smtClean="0"/>
               <a:t>第二级</a:t>
             </a:r>
-            <a:endParaRPr lang="zh-CN" altLang="en-US" smtClean="0"/>
           </a:p>
           <a:p>
             <a:pPr lvl="2"/>
@@ -2044,7 +2035,6 @@
               <a:rPr lang="zh-CN" altLang="en-US" smtClean="0"/>
               <a:t>第三级</a:t>
             </a:r>
-            <a:endParaRPr lang="zh-CN" altLang="en-US" smtClean="0"/>
           </a:p>
           <a:p>
             <a:pPr lvl="3"/>
@@ -2052,7 +2042,6 @@
               <a:rPr lang="zh-CN" altLang="en-US" smtClean="0"/>
               <a:t>第四级</a:t>
             </a:r>
-            <a:endParaRPr lang="zh-CN" altLang="en-US" smtClean="0"/>
           </a:p>
           <a:p>
             <a:pPr lvl="4"/>
@@ -2081,6 +2070,7 @@
           <a:p>
             <a:fld id="{82F288E0-7875-42C4-84C8-98DBBD3BF4D2}" type="datetimeFigureOut">
               <a:rPr lang="zh-CN" altLang="en-US" smtClean="0"/>
+              <a:t>2018/5/14</a:t>
             </a:fld>
             <a:endParaRPr lang="zh-CN" altLang="en-US"/>
           </a:p>
@@ -2122,6 +2112,7 @@
           <a:p>
             <a:fld id="{7D9BB5D0-35E4-459D-AEF3-FE4D7C45CC19}" type="slidenum">
               <a:rPr lang="zh-CN" altLang="en-US" smtClean="0"/>
+              <a:t>‹#›</a:t>
             </a:fld>
             <a:endParaRPr lang="zh-CN" altLang="en-US"/>
           </a:p>
@@ -2220,7 +2211,6 @@
               <a:rPr lang="zh-CN" altLang="en-US" smtClean="0"/>
               <a:t>单击此处编辑母版文本样式</a:t>
             </a:r>
-            <a:endParaRPr lang="zh-CN" altLang="en-US" smtClean="0"/>
           </a:p>
           <a:p>
             <a:pPr lvl="1"/>
@@ -2228,7 +2218,6 @@
               <a:rPr lang="zh-CN" altLang="en-US" smtClean="0"/>
               <a:t>第二级</a:t>
             </a:r>
-            <a:endParaRPr lang="zh-CN" altLang="en-US" smtClean="0"/>
           </a:p>
           <a:p>
             <a:pPr lvl="2"/>
@@ -2236,7 +2225,6 @@
               <a:rPr lang="zh-CN" altLang="en-US" smtClean="0"/>
               <a:t>第三级</a:t>
             </a:r>
-            <a:endParaRPr lang="zh-CN" altLang="en-US" smtClean="0"/>
           </a:p>
           <a:p>
             <a:pPr lvl="3"/>
@@ -2244,7 +2232,6 @@
               <a:rPr lang="zh-CN" altLang="en-US" smtClean="0"/>
               <a:t>第四级</a:t>
             </a:r>
-            <a:endParaRPr lang="zh-CN" altLang="en-US" smtClean="0"/>
           </a:p>
           <a:p>
             <a:pPr lvl="4"/>
@@ -2291,6 +2278,7 @@
           <a:p>
             <a:fld id="{82F288E0-7875-42C4-84C8-98DBBD3BF4D2}" type="datetimeFigureOut">
               <a:rPr lang="zh-CN" altLang="en-US" smtClean="0"/>
+              <a:t>2018/5/14</a:t>
             </a:fld>
             <a:endParaRPr lang="zh-CN" altLang="en-US"/>
           </a:p>
@@ -2368,6 +2356,7 @@
           <a:p>
             <a:fld id="{7D9BB5D0-35E4-459D-AEF3-FE4D7C45CC19}" type="slidenum">
               <a:rPr lang="zh-CN" altLang="en-US" smtClean="0"/>
+              <a:t>‹#›</a:t>
             </a:fld>
             <a:endParaRPr lang="zh-CN" altLang="en-US"/>
           </a:p>
@@ -2680,7 +2669,14 @@
         <p:cNvGrpSpPr/>
         <p:nvPr/>
       </p:nvGrpSpPr>
-      <p:grpSpPr/>
+      <p:grpSpPr>
+        <a:xfrm>
+          <a:off x="0" y="0"/>
+          <a:ext cx="0" cy="0"/>
+          <a:chOff x="0" y="0"/>
+          <a:chExt cx="0" cy="0"/>
+        </a:xfrm>
+      </p:grpSpPr>
       <p:sp>
         <p:nvSpPr>
           <p:cNvPr id="2" name="标题 1"/>
@@ -2694,12 +2690,12 @@
         <p:spPr/>
         <p:txBody>
           <a:bodyPr/>
+          <a:lstStyle/>
           <a:p>
             <a:r>
               <a:rPr lang="en-US" altLang="zh-CN"/>
               <a:t>Music Database Application </a:t>
             </a:r>
-            <a:endParaRPr lang="en-US" altLang="zh-CN"/>
           </a:p>
         </p:txBody>
       </p:sp>
@@ -2716,19 +2712,18 @@
         <p:spPr/>
         <p:txBody>
           <a:bodyPr/>
+          <a:lstStyle/>
           <a:p>
             <a:r>
               <a:rPr lang="en-US" altLang="zh-CN"/>
               <a:t>CSC675-02</a:t>
             </a:r>
-            <a:endParaRPr lang="en-US" altLang="zh-CN"/>
           </a:p>
           <a:p>
             <a:r>
               <a:rPr lang="en-US" altLang="zh-CN"/>
               <a:t>Group Members: Keawa Rozet, Dian Zhu, Jeffrey Lee, Jia Jun Guan</a:t>
             </a:r>
-            <a:endParaRPr lang="en-US" altLang="zh-CN"/>
           </a:p>
         </p:txBody>
       </p:sp>
@@ -2737,6 +2732,13 @@
   <p:clrMapOvr>
     <a:masterClrMapping/>
   </p:clrMapOvr>
+  <p:timing>
+    <p:tnLst>
+      <p:par>
+        <p:cTn id="1" dur="indefinite" restart="never" nodeType="tmRoot"/>
+      </p:par>
+    </p:tnLst>
+  </p:timing>
 </p:sld>
 </file>
 
@@ -2749,7 +2751,14 @@
         <p:cNvGrpSpPr/>
         <p:nvPr/>
       </p:nvGrpSpPr>
-      <p:grpSpPr/>
+      <p:grpSpPr>
+        <a:xfrm>
+          <a:off x="0" y="0"/>
+          <a:ext cx="0" cy="0"/>
+          <a:chOff x="0" y="0"/>
+          <a:chExt cx="0" cy="0"/>
+        </a:xfrm>
+      </p:grpSpPr>
       <p:sp>
         <p:nvSpPr>
           <p:cNvPr id="2" name="标题 1"/>
@@ -2763,12 +2772,12 @@
         <p:spPr/>
         <p:txBody>
           <a:bodyPr/>
+          <a:lstStyle/>
           <a:p>
             <a:r>
               <a:rPr lang="en-US" altLang="zh-CN"/>
               <a:t>Create Releases Table</a:t>
             </a:r>
-            <a:endParaRPr lang="en-US" altLang="zh-CN"/>
           </a:p>
         </p:txBody>
       </p:sp>
@@ -2787,6 +2796,7 @@
           <a:bodyPr>
             <a:normAutofit lnSpcReduction="10000"/>
           </a:bodyPr>
+          <a:lstStyle/>
           <a:p>
             <a:pPr marL="0" indent="0">
               <a:buNone/>
@@ -2795,7 +2805,6 @@
               <a:rPr lang="zh-CN" altLang="en-US"/>
               <a:t>CREATE TABLE releases</a:t>
             </a:r>
-            <a:endParaRPr lang="zh-CN" altLang="en-US"/>
           </a:p>
           <a:p>
             <a:pPr marL="0" indent="0">
@@ -2805,7 +2814,6 @@
               <a:rPr lang="zh-CN" altLang="en-US"/>
               <a:t>       (abtranum INTEGER,</a:t>
             </a:r>
-            <a:endParaRPr lang="zh-CN" altLang="en-US"/>
           </a:p>
           <a:p>
             <a:pPr marL="0" indent="0">
@@ -2815,7 +2823,6 @@
               <a:rPr lang="zh-CN" altLang="en-US"/>
               <a:t>        aname CHAR(20),</a:t>
             </a:r>
-            <a:endParaRPr lang="zh-CN" altLang="en-US"/>
           </a:p>
           <a:p>
             <a:pPr marL="0" indent="0">
@@ -2825,7 +2832,6 @@
               <a:rPr lang="zh-CN" altLang="en-US"/>
               <a:t>        PRIMARY KEY (abtranum, aname),</a:t>
             </a:r>
-            <a:endParaRPr lang="zh-CN" altLang="en-US"/>
           </a:p>
           <a:p>
             <a:pPr marL="0" indent="0">
@@ -2835,7 +2841,6 @@
               <a:rPr lang="zh-CN" altLang="en-US"/>
               <a:t>        FOREIGN KEY (abtranum)</a:t>
             </a:r>
-            <a:endParaRPr lang="zh-CN" altLang="en-US"/>
           </a:p>
           <a:p>
             <a:pPr marL="0" indent="0">
@@ -2845,7 +2850,6 @@
               <a:rPr lang="zh-CN" altLang="en-US"/>
               <a:t>          REFERENCES album (abtranum),</a:t>
             </a:r>
-            <a:endParaRPr lang="zh-CN" altLang="en-US"/>
           </a:p>
           <a:p>
             <a:pPr marL="0" indent="0">
@@ -2855,7 +2859,6 @@
               <a:rPr lang="zh-CN" altLang="en-US"/>
               <a:t>        FOREIGN KEY (aname)</a:t>
             </a:r>
-            <a:endParaRPr lang="zh-CN" altLang="en-US"/>
           </a:p>
           <a:p>
             <a:pPr marL="0" indent="0">
@@ -2865,7 +2868,6 @@
               <a:rPr lang="zh-CN" altLang="en-US"/>
               <a:t>          REFERENCES artist (aname)</a:t>
             </a:r>
-            <a:endParaRPr lang="zh-CN" altLang="en-US"/>
           </a:p>
           <a:p>
             <a:pPr marL="0" indent="0">
@@ -2875,7 +2877,6 @@
               <a:rPr lang="zh-CN" altLang="en-US"/>
               <a:t>);</a:t>
             </a:r>
-            <a:endParaRPr lang="zh-CN" altLang="en-US"/>
           </a:p>
         </p:txBody>
       </p:sp>
@@ -2884,6 +2885,13 @@
   <p:clrMapOvr>
     <a:masterClrMapping/>
   </p:clrMapOvr>
+  <p:timing>
+    <p:tnLst>
+      <p:par>
+        <p:cTn id="1" dur="indefinite" restart="never" nodeType="tmRoot"/>
+      </p:par>
+    </p:tnLst>
+  </p:timing>
 </p:sld>
 </file>
 
@@ -2896,7 +2904,14 @@
         <p:cNvGrpSpPr/>
         <p:nvPr/>
       </p:nvGrpSpPr>
-      <p:grpSpPr/>
+      <p:grpSpPr>
+        <a:xfrm>
+          <a:off x="0" y="0"/>
+          <a:ext cx="0" cy="0"/>
+          <a:chOff x="0" y="0"/>
+          <a:chExt cx="0" cy="0"/>
+        </a:xfrm>
+      </p:grpSpPr>
       <p:sp>
         <p:nvSpPr>
           <p:cNvPr id="2" name="标题 1"/>
@@ -2910,12 +2925,12 @@
         <p:spPr/>
         <p:txBody>
           <a:bodyPr/>
+          <a:lstStyle/>
           <a:p>
             <a:r>
               <a:rPr lang="en-US" altLang="zh-CN"/>
               <a:t>Create Feature Table</a:t>
             </a:r>
-            <a:endParaRPr lang="en-US" altLang="zh-CN"/>
           </a:p>
         </p:txBody>
       </p:sp>
@@ -2932,8 +2947,9 @@
         <p:spPr/>
         <p:txBody>
           <a:bodyPr>
-            <a:normAutofit fontScale="60000"/>
+            <a:normAutofit fontScale="67500" lnSpcReduction="10000"/>
           </a:bodyPr>
+          <a:lstStyle/>
           <a:p>
             <a:pPr marL="0" indent="0">
               <a:buNone/>
@@ -2942,7 +2958,6 @@
               <a:rPr lang="zh-CN" altLang="en-US"/>
               <a:t>CREATE TABLE feature</a:t>
             </a:r>
-            <a:endParaRPr lang="zh-CN" altLang="en-US"/>
           </a:p>
           <a:p>
             <a:pPr marL="0" indent="0">
@@ -2952,7 +2967,6 @@
               <a:rPr lang="zh-CN" altLang="en-US"/>
               <a:t>       (faname CHAR(20),</a:t>
             </a:r>
-            <a:endParaRPr lang="zh-CN" altLang="en-US"/>
           </a:p>
           <a:p>
             <a:pPr marL="0" indent="0">
@@ -2962,7 +2976,6 @@
               <a:rPr lang="zh-CN" altLang="en-US"/>
               <a:t>        stranum INTEGER,</a:t>
             </a:r>
-            <a:endParaRPr lang="zh-CN" altLang="en-US"/>
           </a:p>
           <a:p>
             <a:pPr marL="0" indent="0">
@@ -2972,7 +2985,6 @@
               <a:rPr lang="zh-CN" altLang="en-US"/>
               <a:t>       abtranum INTEGER,</a:t>
             </a:r>
-            <a:endParaRPr lang="zh-CN" altLang="en-US"/>
           </a:p>
           <a:p>
             <a:pPr marL="0" indent="0">
@@ -2982,7 +2994,6 @@
               <a:rPr lang="zh-CN" altLang="en-US"/>
               <a:t>        PRIMARY KEY (faname, stranum, abtranum),</a:t>
             </a:r>
-            <a:endParaRPr lang="zh-CN" altLang="en-US"/>
           </a:p>
           <a:p>
             <a:pPr marL="0" indent="0">
@@ -2992,7 +3003,6 @@
               <a:rPr lang="zh-CN" altLang="en-US"/>
               <a:t>        FOREIGN KEY (faname)</a:t>
             </a:r>
-            <a:endParaRPr lang="zh-CN" altLang="en-US"/>
           </a:p>
           <a:p>
             <a:pPr marL="0" indent="0">
@@ -3002,7 +3012,6 @@
               <a:rPr lang="zh-CN" altLang="en-US"/>
               <a:t>          REFERENCES featured_artist (faname),</a:t>
             </a:r>
-            <a:endParaRPr lang="zh-CN" altLang="en-US"/>
           </a:p>
           <a:p>
             <a:pPr marL="0" indent="0">
@@ -3012,7 +3021,6 @@
               <a:rPr lang="zh-CN" altLang="en-US"/>
               <a:t>        FOREIGN KEY (stranum)</a:t>
             </a:r>
-            <a:endParaRPr lang="zh-CN" altLang="en-US"/>
           </a:p>
           <a:p>
             <a:pPr marL="0" indent="0">
@@ -3022,7 +3030,6 @@
               <a:rPr lang="zh-CN" altLang="en-US"/>
               <a:t>          REFERENCES song (stranum),</a:t>
             </a:r>
-            <a:endParaRPr lang="zh-CN" altLang="en-US"/>
           </a:p>
           <a:p>
             <a:pPr marL="0" indent="0">
@@ -3032,7 +3039,6 @@
               <a:rPr lang="zh-CN" altLang="en-US"/>
               <a:t>       FOREIGN KEY (abtranum)</a:t>
             </a:r>
-            <a:endParaRPr lang="zh-CN" altLang="en-US"/>
           </a:p>
           <a:p>
             <a:pPr marL="0" indent="0">
@@ -3042,7 +3048,6 @@
               <a:rPr lang="zh-CN" altLang="en-US"/>
               <a:t>         REFERENCES album (abtranum)</a:t>
             </a:r>
-            <a:endParaRPr lang="zh-CN" altLang="en-US"/>
           </a:p>
           <a:p>
             <a:pPr marL="0" indent="0">
@@ -3052,7 +3057,6 @@
               <a:rPr lang="zh-CN" altLang="en-US"/>
               <a:t>);</a:t>
             </a:r>
-            <a:endParaRPr lang="zh-CN" altLang="en-US"/>
           </a:p>
         </p:txBody>
       </p:sp>
@@ -3061,6 +3065,13 @@
   <p:clrMapOvr>
     <a:masterClrMapping/>
   </p:clrMapOvr>
+  <p:timing>
+    <p:tnLst>
+      <p:par>
+        <p:cTn id="1" dur="indefinite" restart="never" nodeType="tmRoot"/>
+      </p:par>
+    </p:tnLst>
+  </p:timing>
 </p:sld>
 </file>
 
@@ -3073,7 +3084,14 @@
         <p:cNvGrpSpPr/>
         <p:nvPr/>
       </p:nvGrpSpPr>
-      <p:grpSpPr/>
+      <p:grpSpPr>
+        <a:xfrm>
+          <a:off x="0" y="0"/>
+          <a:ext cx="0" cy="0"/>
+          <a:chOff x="0" y="0"/>
+          <a:chExt cx="0" cy="0"/>
+        </a:xfrm>
+      </p:grpSpPr>
       <p:sp>
         <p:nvSpPr>
           <p:cNvPr id="2" name="标题 1"/>
@@ -3087,12 +3105,12 @@
         <p:spPr/>
         <p:txBody>
           <a:bodyPr/>
+          <a:lstStyle/>
           <a:p>
             <a:r>
               <a:rPr lang="en-US" altLang="zh-CN"/>
               <a:t>Create Indexes</a:t>
             </a:r>
-            <a:endParaRPr lang="en-US" altLang="zh-CN"/>
           </a:p>
         </p:txBody>
       </p:sp>
@@ -3109,6 +3127,7 @@
         <p:spPr/>
         <p:txBody>
           <a:bodyPr/>
+          <a:lstStyle/>
           <a:p>
             <a:pPr marL="0" indent="0">
               <a:buNone/>
@@ -3117,7 +3136,6 @@
               <a:rPr lang="zh-CN" altLang="en-US"/>
               <a:t>CREATE INDEX  IX_firstChar ON artist (aname(1));</a:t>
             </a:r>
-            <a:endParaRPr lang="zh-CN" altLang="en-US"/>
           </a:p>
           <a:p>
             <a:pPr marL="0" indent="0">
@@ -3127,7 +3145,6 @@
               <a:rPr lang="zh-CN" altLang="en-US"/>
               <a:t>CREATE INDEX IX_song_name ON song (sname);</a:t>
             </a:r>
-            <a:endParaRPr lang="zh-CN" altLang="en-US"/>
           </a:p>
         </p:txBody>
       </p:sp>
@@ -3136,6 +3153,13 @@
   <p:clrMapOvr>
     <a:masterClrMapping/>
   </p:clrMapOvr>
+  <p:timing>
+    <p:tnLst>
+      <p:par>
+        <p:cTn id="1" dur="indefinite" restart="never" nodeType="tmRoot"/>
+      </p:par>
+    </p:tnLst>
+  </p:timing>
 </p:sld>
 </file>
 
@@ -3148,7 +3172,14 @@
         <p:cNvGrpSpPr/>
         <p:nvPr/>
       </p:nvGrpSpPr>
-      <p:grpSpPr/>
+      <p:grpSpPr>
+        <a:xfrm>
+          <a:off x="0" y="0"/>
+          <a:ext cx="0" cy="0"/>
+          <a:chOff x="0" y="0"/>
+          <a:chExt cx="0" cy="0"/>
+        </a:xfrm>
+      </p:grpSpPr>
       <p:sp>
         <p:nvSpPr>
           <p:cNvPr id="2" name="标题 1"/>
@@ -3162,12 +3193,12 @@
         <p:spPr/>
         <p:txBody>
           <a:bodyPr/>
+          <a:lstStyle/>
           <a:p>
             <a:r>
               <a:rPr lang="en-US" altLang="zh-CN"/>
               <a:t>Create View</a:t>
             </a:r>
-            <a:endParaRPr lang="en-US" altLang="zh-CN"/>
           </a:p>
         </p:txBody>
       </p:sp>
@@ -3184,6 +3215,7 @@
         <p:spPr/>
         <p:txBody>
           <a:bodyPr/>
+          <a:lstStyle/>
           <a:p>
             <a:pPr marL="0" indent="0">
               <a:buNone/>
@@ -3192,7 +3224,6 @@
               <a:rPr lang="zh-CN" altLang="en-US"/>
               <a:t>CREATE VIEW V_Songs</a:t>
             </a:r>
-            <a:endParaRPr lang="zh-CN" altLang="en-US"/>
           </a:p>
           <a:p>
             <a:pPr marL="0" indent="0">
@@ -3202,7 +3233,6 @@
               <a:rPr lang="zh-CN" altLang="en-US"/>
               <a:t>AS SELECT sname, abname, aname</a:t>
             </a:r>
-            <a:endParaRPr lang="zh-CN" altLang="en-US"/>
           </a:p>
           <a:p>
             <a:pPr marL="0" indent="0">
@@ -3212,7 +3242,6 @@
               <a:rPr lang="zh-CN" altLang="en-US"/>
               <a:t>FROM song;</a:t>
             </a:r>
-            <a:endParaRPr lang="zh-CN" altLang="en-US"/>
           </a:p>
           <a:p>
             <a:pPr marL="0" indent="0">
@@ -3228,7 +3257,6 @@
               <a:rPr lang="zh-CN" altLang="en-US"/>
               <a:t>CREATE VIEW V_FeaturedArtists</a:t>
             </a:r>
-            <a:endParaRPr lang="zh-CN" altLang="en-US"/>
           </a:p>
           <a:p>
             <a:pPr marL="0" indent="0">
@@ -3238,7 +3266,6 @@
               <a:rPr lang="zh-CN" altLang="en-US"/>
               <a:t>AS SELECT faname</a:t>
             </a:r>
-            <a:endParaRPr lang="zh-CN" altLang="en-US"/>
           </a:p>
           <a:p>
             <a:pPr marL="0" indent="0">
@@ -3248,7 +3275,6 @@
               <a:rPr lang="zh-CN" altLang="en-US"/>
               <a:t>FROM feature;</a:t>
             </a:r>
-            <a:endParaRPr lang="zh-CN" altLang="en-US"/>
           </a:p>
         </p:txBody>
       </p:sp>
@@ -3257,6 +3283,13 @@
   <p:clrMapOvr>
     <a:masterClrMapping/>
   </p:clrMapOvr>
+  <p:timing>
+    <p:tnLst>
+      <p:par>
+        <p:cTn id="1" dur="indefinite" restart="never" nodeType="tmRoot"/>
+      </p:par>
+    </p:tnLst>
+  </p:timing>
 </p:sld>
 </file>
 
@@ -3269,7 +3302,14 @@
         <p:cNvGrpSpPr/>
         <p:nvPr/>
       </p:nvGrpSpPr>
-      <p:grpSpPr/>
+      <p:grpSpPr>
+        <a:xfrm>
+          <a:off x="0" y="0"/>
+          <a:ext cx="0" cy="0"/>
+          <a:chOff x="0" y="0"/>
+          <a:chExt cx="0" cy="0"/>
+        </a:xfrm>
+      </p:grpSpPr>
       <p:sp>
         <p:nvSpPr>
           <p:cNvPr id="2" name="标题 1"/>
@@ -3283,12 +3323,12 @@
         <p:spPr/>
         <p:txBody>
           <a:bodyPr/>
+          <a:lstStyle/>
           <a:p>
             <a:r>
               <a:rPr lang="en-US" altLang="zh-CN"/>
               <a:t>SQL Nested Query  -  IN</a:t>
             </a:r>
-            <a:endParaRPr lang="en-US" altLang="zh-CN"/>
           </a:p>
         </p:txBody>
       </p:sp>
@@ -3305,6 +3345,7 @@
         <p:spPr/>
         <p:txBody>
           <a:bodyPr/>
+          <a:lstStyle/>
           <a:p>
             <a:pPr marL="0" indent="0">
               <a:buNone/>
@@ -3313,7 +3354,6 @@
               <a:rPr lang="zh-CN" altLang="en-US"/>
               <a:t>/* Find the name of song that is composed of album ‘From A Room: Volume 1‘. */ </a:t>
             </a:r>
-            <a:endParaRPr lang="zh-CN" altLang="en-US"/>
           </a:p>
           <a:p>
             <a:pPr marL="0" indent="0">
@@ -3323,7 +3363,6 @@
               <a:rPr lang="zh-CN" altLang="en-US"/>
               <a:t>SELECT S.sname</a:t>
             </a:r>
-            <a:endParaRPr lang="zh-CN" altLang="en-US"/>
           </a:p>
           <a:p>
             <a:pPr marL="0" indent="0">
@@ -3333,7 +3372,6 @@
               <a:rPr lang="zh-CN" altLang="en-US"/>
               <a:t>FROM song S</a:t>
             </a:r>
-            <a:endParaRPr lang="zh-CN" altLang="en-US"/>
           </a:p>
           <a:p>
             <a:pPr marL="0" indent="0">
@@ -3343,7 +3381,6 @@
               <a:rPr lang="zh-CN" altLang="en-US"/>
               <a:t>WHERE S.abname IN (SELECT A.abname</a:t>
             </a:r>
-            <a:endParaRPr lang="zh-CN" altLang="en-US"/>
           </a:p>
           <a:p>
             <a:pPr marL="0" indent="0">
@@ -3353,7 +3390,6 @@
               <a:rPr lang="zh-CN" altLang="en-US"/>
               <a:t>                 FROM album A</a:t>
             </a:r>
-            <a:endParaRPr lang="zh-CN" altLang="en-US"/>
           </a:p>
           <a:p>
             <a:pPr marL="0" indent="0">
@@ -3363,7 +3399,6 @@
               <a:rPr lang="zh-CN" altLang="en-US"/>
               <a:t>                 WHERE A.abname= 'From A Room: Volume 1');</a:t>
             </a:r>
-            <a:endParaRPr lang="zh-CN" altLang="en-US"/>
           </a:p>
           <a:p>
             <a:endParaRPr lang="zh-CN" altLang="en-US"/>
@@ -3379,7 +3414,7 @@
           <p:nvPr/>
         </p:nvPicPr>
         <p:blipFill>
-          <a:blip r:embed="rId1"/>
+          <a:blip r:embed="rId2"/>
           <a:stretch>
             <a:fillRect/>
           </a:stretch>
@@ -3399,6 +3434,13 @@
   <p:clrMapOvr>
     <a:masterClrMapping/>
   </p:clrMapOvr>
+  <p:timing>
+    <p:tnLst>
+      <p:par>
+        <p:cTn id="1" dur="indefinite" restart="never" nodeType="tmRoot"/>
+      </p:par>
+    </p:tnLst>
+  </p:timing>
 </p:sld>
 </file>
 
@@ -3411,7 +3453,14 @@
         <p:cNvGrpSpPr/>
         <p:nvPr/>
       </p:nvGrpSpPr>
-      <p:grpSpPr/>
+      <p:grpSpPr>
+        <a:xfrm>
+          <a:off x="0" y="0"/>
+          <a:ext cx="0" cy="0"/>
+          <a:chOff x="0" y="0"/>
+          <a:chExt cx="0" cy="0"/>
+        </a:xfrm>
+      </p:grpSpPr>
       <p:sp>
         <p:nvSpPr>
           <p:cNvPr id="2" name="标题 1"/>
@@ -3425,12 +3474,12 @@
         <p:spPr/>
         <p:txBody>
           <a:bodyPr/>
+          <a:lstStyle/>
           <a:p>
             <a:r>
               <a:rPr lang="en-US" altLang="zh-CN"/>
               <a:t>SQL Nested Query - IN</a:t>
             </a:r>
-            <a:endParaRPr lang="en-US" altLang="zh-CN"/>
           </a:p>
         </p:txBody>
       </p:sp>
@@ -3447,6 +3496,7 @@
         <p:spPr/>
         <p:txBody>
           <a:bodyPr/>
+          <a:lstStyle/>
           <a:p>
             <a:pPr marL="0" indent="0">
               <a:buNone/>
@@ -3455,7 +3505,6 @@
               <a:rPr lang="zh-CN" altLang="en-US"/>
               <a:t>/* Find the names of all songs that were written by the artist “Pentatonix” */</a:t>
             </a:r>
-            <a:endParaRPr lang="zh-CN" altLang="en-US"/>
           </a:p>
           <a:p>
             <a:pPr marL="0" indent="0">
@@ -3465,7 +3514,6 @@
               <a:rPr lang="zh-CN" altLang="en-US"/>
               <a:t>SELECT S.sname</a:t>
             </a:r>
-            <a:endParaRPr lang="zh-CN" altLang="en-US"/>
           </a:p>
           <a:p>
             <a:pPr marL="0" indent="0">
@@ -3475,7 +3523,6 @@
               <a:rPr lang="zh-CN" altLang="en-US"/>
               <a:t>FROM song S</a:t>
             </a:r>
-            <a:endParaRPr lang="zh-CN" altLang="en-US"/>
           </a:p>
           <a:p>
             <a:pPr marL="0" indent="0">
@@ -3485,7 +3532,6 @@
               <a:rPr lang="zh-CN" altLang="en-US"/>
               <a:t>WHERE S.aname IN (SELECT A.aname</a:t>
             </a:r>
-            <a:endParaRPr lang="zh-CN" altLang="en-US"/>
           </a:p>
           <a:p>
             <a:pPr marL="0" indent="0">
@@ -3495,7 +3541,6 @@
               <a:rPr lang="zh-CN" altLang="en-US"/>
               <a:t>                 FROM artist A</a:t>
             </a:r>
-            <a:endParaRPr lang="zh-CN" altLang="en-US"/>
           </a:p>
           <a:p>
             <a:pPr marL="0" indent="0">
@@ -3505,7 +3550,6 @@
               <a:rPr lang="zh-CN" altLang="en-US"/>
               <a:t>                 WHERE A.aname= 'Pentatonix');</a:t>
             </a:r>
-            <a:endParaRPr lang="zh-CN" altLang="en-US"/>
           </a:p>
         </p:txBody>
       </p:sp>
@@ -3518,7 +3562,7 @@
           <p:nvPr/>
         </p:nvPicPr>
         <p:blipFill>
-          <a:blip r:embed="rId1"/>
+          <a:blip r:embed="rId2"/>
           <a:stretch>
             <a:fillRect/>
           </a:stretch>
@@ -3538,6 +3582,13 @@
   <p:clrMapOvr>
     <a:masterClrMapping/>
   </p:clrMapOvr>
+  <p:timing>
+    <p:tnLst>
+      <p:par>
+        <p:cTn id="1" dur="indefinite" restart="never" nodeType="tmRoot"/>
+      </p:par>
+    </p:tnLst>
+  </p:timing>
 </p:sld>
 </file>
 
@@ -3550,7 +3601,14 @@
         <p:cNvGrpSpPr/>
         <p:nvPr/>
       </p:nvGrpSpPr>
-      <p:grpSpPr/>
+      <p:grpSpPr>
+        <a:xfrm>
+          <a:off x="0" y="0"/>
+          <a:ext cx="0" cy="0"/>
+          <a:chOff x="0" y="0"/>
+          <a:chExt cx="0" cy="0"/>
+        </a:xfrm>
+      </p:grpSpPr>
       <p:sp>
         <p:nvSpPr>
           <p:cNvPr id="2" name="标题 1"/>
@@ -3564,12 +3622,12 @@
         <p:spPr/>
         <p:txBody>
           <a:bodyPr/>
+          <a:lstStyle/>
           <a:p>
             <a:r>
               <a:rPr lang="en-US" altLang="zh-CN"/>
               <a:t>SQL Nested Query - EXISTS</a:t>
             </a:r>
-            <a:endParaRPr lang="en-US" altLang="zh-CN"/>
           </a:p>
         </p:txBody>
       </p:sp>
@@ -3586,6 +3644,7 @@
         <p:spPr/>
         <p:txBody>
           <a:bodyPr/>
+          <a:lstStyle/>
           <a:p>
             <a:pPr marL="0" indent="0">
               <a:buNone/>
@@ -3594,7 +3653,6 @@
               <a:rPr lang="zh-CN" altLang="en-US"/>
               <a:t>/* Find the total number of songs that are wriiten by artist ‘ Pentatonix’*/ </a:t>
             </a:r>
-            <a:endParaRPr lang="zh-CN" altLang="en-US"/>
           </a:p>
           <a:p>
             <a:pPr marL="0" indent="0">
@@ -3604,7 +3662,6 @@
               <a:rPr lang="zh-CN" altLang="en-US"/>
               <a:t>SELECT COUNT(DISTINCT S.stranum)</a:t>
             </a:r>
-            <a:endParaRPr lang="zh-CN" altLang="en-US"/>
           </a:p>
           <a:p>
             <a:pPr marL="0" indent="0">
@@ -3614,7 +3671,6 @@
               <a:rPr lang="zh-CN" altLang="en-US"/>
               <a:t>FROM song S</a:t>
             </a:r>
-            <a:endParaRPr lang="zh-CN" altLang="en-US"/>
           </a:p>
           <a:p>
             <a:pPr marL="0" indent="0">
@@ -3624,7 +3680,6 @@
               <a:rPr lang="zh-CN" altLang="en-US"/>
               <a:t>WHERE EXISTS (SELECT *</a:t>
             </a:r>
-            <a:endParaRPr lang="zh-CN" altLang="en-US"/>
           </a:p>
           <a:p>
             <a:pPr marL="0" indent="0">
@@ -3634,7 +3689,6 @@
               <a:rPr lang="zh-CN" altLang="en-US"/>
               <a:t>             FROM artist A</a:t>
             </a:r>
-            <a:endParaRPr lang="zh-CN" altLang="en-US"/>
           </a:p>
           <a:p>
             <a:pPr marL="0" indent="0">
@@ -3644,7 +3698,6 @@
               <a:rPr lang="zh-CN" altLang="en-US"/>
               <a:t>             WHERE S.aname=A.aname AND A.aname= 'Pentatonix');</a:t>
             </a:r>
-            <a:endParaRPr lang="zh-CN" altLang="en-US"/>
           </a:p>
         </p:txBody>
       </p:sp>
@@ -3657,7 +3710,7 @@
           <p:nvPr/>
         </p:nvPicPr>
         <p:blipFill>
-          <a:blip r:embed="rId1"/>
+          <a:blip r:embed="rId2"/>
           <a:stretch>
             <a:fillRect/>
           </a:stretch>
@@ -3677,6 +3730,13 @@
   <p:clrMapOvr>
     <a:masterClrMapping/>
   </p:clrMapOvr>
+  <p:timing>
+    <p:tnLst>
+      <p:par>
+        <p:cTn id="1" dur="indefinite" restart="never" nodeType="tmRoot"/>
+      </p:par>
+    </p:tnLst>
+  </p:timing>
 </p:sld>
 </file>
 
@@ -3689,7 +3749,14 @@
         <p:cNvGrpSpPr/>
         <p:nvPr/>
       </p:nvGrpSpPr>
-      <p:grpSpPr/>
+      <p:grpSpPr>
+        <a:xfrm>
+          <a:off x="0" y="0"/>
+          <a:ext cx="0" cy="0"/>
+          <a:chOff x="0" y="0"/>
+          <a:chExt cx="0" cy="0"/>
+        </a:xfrm>
+      </p:grpSpPr>
       <p:sp>
         <p:nvSpPr>
           <p:cNvPr id="2" name="标题 1"/>
@@ -3703,12 +3770,12 @@
         <p:spPr/>
         <p:txBody>
           <a:bodyPr/>
+          <a:lstStyle/>
           <a:p>
             <a:r>
               <a:rPr lang="en-US" altLang="zh-CN"/>
               <a:t>SQL Nested Query - EXISTS</a:t>
             </a:r>
-            <a:endParaRPr lang="en-US" altLang="zh-CN"/>
           </a:p>
         </p:txBody>
       </p:sp>
@@ -3725,6 +3792,7 @@
         <p:spPr/>
         <p:txBody>
           <a:bodyPr/>
+          <a:lstStyle/>
           <a:p>
             <a:pPr marL="0" indent="0">
               <a:buNone/>
@@ -3733,7 +3801,6 @@
               <a:rPr lang="zh-CN" altLang="en-US"/>
               <a:t>/* Find the total number of songs that are composed of the album ''From A Room: Volume 1' */ </a:t>
             </a:r>
-            <a:endParaRPr lang="zh-CN" altLang="en-US"/>
           </a:p>
           <a:p>
             <a:pPr marL="0" indent="0">
@@ -3743,7 +3810,6 @@
               <a:rPr lang="zh-CN" altLang="en-US"/>
               <a:t>SELECT COUNT(DISTINCT S.stranum)</a:t>
             </a:r>
-            <a:endParaRPr lang="zh-CN" altLang="en-US"/>
           </a:p>
           <a:p>
             <a:pPr marL="0" indent="0">
@@ -3753,7 +3819,6 @@
               <a:rPr lang="zh-CN" altLang="en-US"/>
               <a:t>FROM song S</a:t>
             </a:r>
-            <a:endParaRPr lang="zh-CN" altLang="en-US"/>
           </a:p>
           <a:p>
             <a:pPr marL="0" indent="0">
@@ -3763,7 +3828,6 @@
               <a:rPr lang="zh-CN" altLang="en-US"/>
               <a:t>WHERE EXISTS (SELECT *</a:t>
             </a:r>
-            <a:endParaRPr lang="zh-CN" altLang="en-US"/>
           </a:p>
           <a:p>
             <a:pPr marL="0" indent="0">
@@ -3773,7 +3837,6 @@
               <a:rPr lang="zh-CN" altLang="en-US"/>
               <a:t>             FROM album A</a:t>
             </a:r>
-            <a:endParaRPr lang="zh-CN" altLang="en-US"/>
           </a:p>
           <a:p>
             <a:pPr marL="0" indent="0">
@@ -3783,7 +3846,6 @@
               <a:rPr lang="zh-CN" altLang="en-US"/>
               <a:t>            WHERE S.abname=A.abname AND S.abname= 'From A Room: Volume 1');</a:t>
             </a:r>
-            <a:endParaRPr lang="zh-CN" altLang="en-US"/>
           </a:p>
         </p:txBody>
       </p:sp>
@@ -3796,7 +3858,7 @@
           <p:nvPr/>
         </p:nvPicPr>
         <p:blipFill>
-          <a:blip r:embed="rId1"/>
+          <a:blip r:embed="rId2"/>
           <a:stretch>
             <a:fillRect/>
           </a:stretch>
@@ -3816,6 +3878,13 @@
   <p:clrMapOvr>
     <a:masterClrMapping/>
   </p:clrMapOvr>
+  <p:timing>
+    <p:tnLst>
+      <p:par>
+        <p:cTn id="1" dur="indefinite" restart="never" nodeType="tmRoot"/>
+      </p:par>
+    </p:tnLst>
+  </p:timing>
 </p:sld>
 </file>
 
@@ -3828,7 +3897,14 @@
         <p:cNvGrpSpPr/>
         <p:nvPr/>
       </p:nvGrpSpPr>
-      <p:grpSpPr/>
+      <p:grpSpPr>
+        <a:xfrm>
+          <a:off x="0" y="0"/>
+          <a:ext cx="0" cy="0"/>
+          <a:chOff x="0" y="0"/>
+          <a:chExt cx="0" cy="0"/>
+        </a:xfrm>
+      </p:grpSpPr>
       <p:sp>
         <p:nvSpPr>
           <p:cNvPr id="2" name="标题 1"/>
@@ -3842,12 +3918,12 @@
         <p:spPr/>
         <p:txBody>
           <a:bodyPr/>
+          <a:lstStyle/>
           <a:p>
             <a:r>
               <a:rPr lang="en-US" altLang="zh-CN"/>
               <a:t>SQL Nested Query - op ANY</a:t>
             </a:r>
-            <a:endParaRPr lang="en-US" altLang="zh-CN"/>
           </a:p>
         </p:txBody>
       </p:sp>
@@ -3864,6 +3940,7 @@
         <p:spPr/>
         <p:txBody>
           <a:bodyPr/>
+          <a:lstStyle/>
           <a:p>
             <a:pPr marL="0" indent="0">
               <a:buNone/>
@@ -3872,7 +3949,6 @@
               <a:rPr lang="zh-CN" altLang="en-US"/>
               <a:t>/* List names of featured artist  if ANY use album ‘'A Pentatonix Christmas Deluxe’ */ </a:t>
             </a:r>
-            <a:endParaRPr lang="zh-CN" altLang="en-US"/>
           </a:p>
           <a:p>
             <a:pPr marL="0" indent="0">
@@ -3882,7 +3958,6 @@
               <a:rPr lang="zh-CN" altLang="en-US"/>
               <a:t>SELECT F.faname</a:t>
             </a:r>
-            <a:endParaRPr lang="zh-CN" altLang="en-US"/>
           </a:p>
           <a:p>
             <a:pPr marL="0" indent="0">
@@ -3892,7 +3967,6 @@
               <a:rPr lang="zh-CN" altLang="en-US"/>
               <a:t>FROM feature F</a:t>
             </a:r>
-            <a:endParaRPr lang="zh-CN" altLang="en-US"/>
           </a:p>
           <a:p>
             <a:pPr marL="0" indent="0">
@@ -3902,7 +3976,6 @@
               <a:rPr lang="zh-CN" altLang="en-US"/>
               <a:t>WHERE F.abtranum = ANY (SELECT  A.abtranum</a:t>
             </a:r>
-            <a:endParaRPr lang="zh-CN" altLang="en-US"/>
           </a:p>
           <a:p>
             <a:pPr marL="0" indent="0">
@@ -3912,7 +3985,6 @@
               <a:rPr lang="zh-CN" altLang="en-US"/>
               <a:t>                                             FROM album A</a:t>
             </a:r>
-            <a:endParaRPr lang="zh-CN" altLang="en-US"/>
           </a:p>
           <a:p>
             <a:pPr marL="0" indent="0">
@@ -3922,7 +3994,6 @@
               <a:rPr lang="zh-CN" altLang="en-US"/>
               <a:t>                                            WHERE A.abname='A Pentatonix Christmas Deluxe');</a:t>
             </a:r>
-            <a:endParaRPr lang="zh-CN" altLang="en-US"/>
           </a:p>
         </p:txBody>
       </p:sp>
@@ -3935,7 +4006,7 @@
           <p:nvPr/>
         </p:nvPicPr>
         <p:blipFill>
-          <a:blip r:embed="rId1"/>
+          <a:blip r:embed="rId2"/>
           <a:stretch>
             <a:fillRect/>
           </a:stretch>
@@ -3955,6 +4026,13 @@
   <p:clrMapOvr>
     <a:masterClrMapping/>
   </p:clrMapOvr>
+  <p:timing>
+    <p:tnLst>
+      <p:par>
+        <p:cTn id="1" dur="indefinite" restart="never" nodeType="tmRoot"/>
+      </p:par>
+    </p:tnLst>
+  </p:timing>
 </p:sld>
 </file>
 
@@ -3967,7 +4045,14 @@
         <p:cNvGrpSpPr/>
         <p:nvPr/>
       </p:nvGrpSpPr>
-      <p:grpSpPr/>
+      <p:grpSpPr>
+        <a:xfrm>
+          <a:off x="0" y="0"/>
+          <a:ext cx="0" cy="0"/>
+          <a:chOff x="0" y="0"/>
+          <a:chExt cx="0" cy="0"/>
+        </a:xfrm>
+      </p:grpSpPr>
       <p:sp>
         <p:nvSpPr>
           <p:cNvPr id="2" name="标题 1"/>
@@ -3981,12 +4066,12 @@
         <p:spPr/>
         <p:txBody>
           <a:bodyPr/>
+          <a:lstStyle/>
           <a:p>
             <a:r>
               <a:rPr lang="en-US" altLang="zh-CN"/>
               <a:t>SQL Nested Query - op ANY</a:t>
             </a:r>
-            <a:endParaRPr lang="en-US" altLang="zh-CN"/>
           </a:p>
         </p:txBody>
       </p:sp>
@@ -4008,8 +4093,9 @@
         </p:spPr>
         <p:txBody>
           <a:bodyPr>
-            <a:normAutofit fontScale="60000"/>
+            <a:normAutofit fontScale="67500" lnSpcReduction="10000"/>
           </a:bodyPr>
+          <a:lstStyle/>
           <a:p>
             <a:pPr marL="0" indent="0">
               <a:buNone/>
@@ -4018,7 +4104,6 @@
               <a:rPr lang="zh-CN" altLang="en-US"/>
               <a:t>/* List names of albums  if ANY are released by the artist ‘Hillsong Worship’  */</a:t>
             </a:r>
-            <a:endParaRPr lang="zh-CN" altLang="en-US"/>
           </a:p>
           <a:p>
             <a:pPr marL="0" indent="0">
@@ -4028,7 +4113,6 @@
               <a:rPr lang="zh-CN" altLang="en-US"/>
               <a:t>SELECT abname</a:t>
             </a:r>
-            <a:endParaRPr lang="zh-CN" altLang="en-US"/>
           </a:p>
           <a:p>
             <a:pPr marL="0" indent="0">
@@ -4038,7 +4122,6 @@
               <a:rPr lang="zh-CN" altLang="en-US"/>
               <a:t>FROM album</a:t>
             </a:r>
-            <a:endParaRPr lang="zh-CN" altLang="en-US"/>
           </a:p>
           <a:p>
             <a:pPr marL="0" indent="0">
@@ -4062,7 +4145,6 @@
               <a:rPr lang="zh-CN" altLang="en-US"/>
               <a:t>                                           FROM releases</a:t>
             </a:r>
-            <a:endParaRPr lang="zh-CN" altLang="en-US"/>
           </a:p>
           <a:p>
             <a:pPr marL="0" indent="0">
@@ -4072,7 +4154,6 @@
               <a:rPr lang="zh-CN" altLang="en-US"/>
               <a:t>		      WHERE aname = 'Hillsong Worship');</a:t>
             </a:r>
-            <a:endParaRPr lang="zh-CN" altLang="en-US"/>
           </a:p>
           <a:p>
             <a:pPr marL="0" indent="0">
@@ -4153,6 +4234,13 @@
   <p:clrMapOvr>
     <a:masterClrMapping/>
   </p:clrMapOvr>
+  <p:timing>
+    <p:tnLst>
+      <p:par>
+        <p:cTn id="1" dur="indefinite" restart="never" nodeType="tmRoot"/>
+      </p:par>
+    </p:tnLst>
+  </p:timing>
 </p:sld>
 </file>
 
@@ -4165,7 +4253,14 @@
         <p:cNvGrpSpPr/>
         <p:nvPr/>
       </p:nvGrpSpPr>
-      <p:grpSpPr/>
+      <p:grpSpPr>
+        <a:xfrm>
+          <a:off x="0" y="0"/>
+          <a:ext cx="0" cy="0"/>
+          <a:chOff x="0" y="0"/>
+          <a:chExt cx="0" cy="0"/>
+        </a:xfrm>
+      </p:grpSpPr>
       <p:sp>
         <p:nvSpPr>
           <p:cNvPr id="2" name="标题 1"/>
@@ -4179,14 +4274,14 @@
         <p:spPr/>
         <p:txBody>
           <a:bodyPr>
-            <a:normAutofit fontScale="90000"/>
+            <a:normAutofit/>
           </a:bodyPr>
+          <a:lstStyle/>
           <a:p>
             <a:r>
               <a:rPr lang="zh-CN" altLang="en-US"/>
               <a:t>Description of database and data requirements</a:t>
             </a:r>
-            <a:endParaRPr lang="zh-CN" altLang="en-US"/>
           </a:p>
         </p:txBody>
       </p:sp>
@@ -4205,6 +4300,7 @@
           <a:bodyPr>
             <a:normAutofit lnSpcReduction="10000"/>
           </a:bodyPr>
+          <a:lstStyle/>
           <a:p>
             <a:pPr>
               <a:buFont typeface="Wingdings" panose="05000000000000000000" charset="0"/>
@@ -4214,7 +4310,6 @@
               <a:rPr lang="zh-CN" altLang="en-US"/>
               <a:t>This database is to store information about famous songs. </a:t>
             </a:r>
-            <a:endParaRPr lang="zh-CN" altLang="en-US"/>
           </a:p>
           <a:p>
             <a:pPr>
@@ -4229,7 +4324,6 @@
               <a:rPr lang="en-US" altLang="zh-CN"/>
               <a:t>:</a:t>
             </a:r>
-            <a:endParaRPr lang="en-US" altLang="zh-CN"/>
           </a:p>
           <a:p>
             <a:pPr marL="0" indent="0">
@@ -4239,7 +4333,6 @@
               <a:rPr lang="zh-CN" altLang="en-US"/>
               <a:t>   artists with identified name as an attribute </a:t>
             </a:r>
-            <a:endParaRPr lang="zh-CN" altLang="en-US"/>
           </a:p>
           <a:p>
             <a:pPr marL="0" indent="0">
@@ -4257,7 +4350,6 @@
               <a:rPr lang="zh-CN" altLang="en-US"/>
               <a:t>with identified track number and name as attributes</a:t>
             </a:r>
-            <a:endParaRPr lang="zh-CN" altLang="en-US"/>
           </a:p>
           <a:p>
             <a:pPr marL="0" indent="0">
@@ -4267,7 +4359,6 @@
               <a:rPr lang="zh-CN" altLang="en-US"/>
               <a:t>   featured artists with identified name as an attribute </a:t>
             </a:r>
-            <a:endParaRPr lang="zh-CN" altLang="en-US"/>
           </a:p>
           <a:p>
             <a:pPr marL="0" indent="0">
@@ -4277,7 +4368,6 @@
               <a:rPr lang="zh-CN" altLang="en-US"/>
               <a:t>   albums with identified track number, name, and released date as  attributes. </a:t>
             </a:r>
-            <a:endParaRPr lang="zh-CN" altLang="en-US"/>
           </a:p>
           <a:p>
             <a:pPr>
@@ -4288,7 +4378,6 @@
               <a:rPr lang="zh-CN" altLang="en-US"/>
               <a:t>Each song is written by an artist. Each song may be featured by some featured artists. Each album is released by an artist. Every song must have at least one album.</a:t>
             </a:r>
-            <a:endParaRPr lang="zh-CN" altLang="en-US"/>
           </a:p>
         </p:txBody>
       </p:sp>
@@ -4297,6 +4386,13 @@
   <p:clrMapOvr>
     <a:masterClrMapping/>
   </p:clrMapOvr>
+  <p:timing>
+    <p:tnLst>
+      <p:par>
+        <p:cTn id="1" dur="indefinite" restart="never" nodeType="tmRoot"/>
+      </p:par>
+    </p:tnLst>
+  </p:timing>
 </p:sld>
 </file>
 
@@ -4309,7 +4405,14 @@
         <p:cNvGrpSpPr/>
         <p:nvPr/>
       </p:nvGrpSpPr>
-      <p:grpSpPr/>
+      <p:grpSpPr>
+        <a:xfrm>
+          <a:off x="0" y="0"/>
+          <a:ext cx="0" cy="0"/>
+          <a:chOff x="0" y="0"/>
+          <a:chExt cx="0" cy="0"/>
+        </a:xfrm>
+      </p:grpSpPr>
       <p:sp>
         <p:nvSpPr>
           <p:cNvPr id="2" name="标题 1"/>
@@ -4323,12 +4426,12 @@
         <p:spPr/>
         <p:txBody>
           <a:bodyPr/>
+          <a:lstStyle/>
           <a:p>
             <a:r>
               <a:rPr lang="en-US" altLang="zh-CN"/>
               <a:t>SQL Nested Query - op ALL</a:t>
             </a:r>
-            <a:endParaRPr lang="en-US" altLang="zh-CN"/>
           </a:p>
         </p:txBody>
       </p:sp>
@@ -4345,8 +4448,9 @@
         <p:spPr/>
         <p:txBody>
           <a:bodyPr>
-            <a:normAutofit fontScale="60000"/>
+            <a:normAutofit fontScale="67500" lnSpcReduction="10000"/>
           </a:bodyPr>
+          <a:lstStyle/>
           <a:p>
             <a:pPr marL="0" indent="0">
               <a:buNone/>
@@ -4355,7 +4459,6 @@
               <a:rPr lang="zh-CN" altLang="en-US"/>
               <a:t>/ *List names of artists if ALL use album ‘A Pentatonix Christmas Deluxe’*/ </a:t>
             </a:r>
-            <a:endParaRPr lang="zh-CN" altLang="en-US"/>
           </a:p>
           <a:p>
             <a:pPr marL="0" indent="0">
@@ -4365,7 +4468,6 @@
               <a:rPr lang="zh-CN" altLang="en-US"/>
               <a:t>SELECT R.aname</a:t>
             </a:r>
-            <a:endParaRPr lang="zh-CN" altLang="en-US"/>
           </a:p>
           <a:p>
             <a:pPr marL="0" indent="0">
@@ -4375,7 +4477,6 @@
               <a:rPr lang="zh-CN" altLang="en-US"/>
               <a:t>FROM releases R</a:t>
             </a:r>
-            <a:endParaRPr lang="zh-CN" altLang="en-US"/>
           </a:p>
           <a:p>
             <a:pPr marL="0" indent="0">
@@ -4385,7 +4486,6 @@
               <a:rPr lang="zh-CN" altLang="en-US"/>
               <a:t>WHERE R.abtranum = ALL (SELECT  A.abtranum</a:t>
             </a:r>
-            <a:endParaRPr lang="zh-CN" altLang="en-US"/>
           </a:p>
           <a:p>
             <a:pPr marL="0" indent="0">
@@ -4395,7 +4495,6 @@
               <a:rPr lang="zh-CN" altLang="en-US"/>
               <a:t>                                            FROM album A</a:t>
             </a:r>
-            <a:endParaRPr lang="zh-CN" altLang="en-US"/>
           </a:p>
           <a:p>
             <a:pPr marL="0" indent="0">
@@ -4405,7 +4504,6 @@
               <a:rPr lang="zh-CN" altLang="en-US"/>
               <a:t>                                           WHERE A.abname='A Pentatonix Christmas Deluxe');</a:t>
             </a:r>
-            <a:endParaRPr lang="zh-CN" altLang="en-US"/>
           </a:p>
           <a:p>
             <a:pPr marL="0" indent="0">
@@ -4421,7 +4519,6 @@
               <a:rPr lang="zh-CN" altLang="en-US"/>
               <a:t>+------------+</a:t>
             </a:r>
-            <a:endParaRPr lang="zh-CN" altLang="en-US"/>
           </a:p>
           <a:p>
             <a:pPr marL="0" indent="0">
@@ -4431,7 +4528,6 @@
               <a:rPr lang="zh-CN" altLang="en-US"/>
               <a:t>| aname      |</a:t>
             </a:r>
-            <a:endParaRPr lang="zh-CN" altLang="en-US"/>
           </a:p>
           <a:p>
             <a:pPr marL="0" indent="0">
@@ -4441,7 +4537,6 @@
               <a:rPr lang="zh-CN" altLang="en-US"/>
               <a:t>+------------+</a:t>
             </a:r>
-            <a:endParaRPr lang="zh-CN" altLang="en-US"/>
           </a:p>
           <a:p>
             <a:pPr marL="0" indent="0">
@@ -4451,7 +4546,6 @@
               <a:rPr lang="zh-CN" altLang="en-US"/>
               <a:t>| Pentatonix |</a:t>
             </a:r>
-            <a:endParaRPr lang="zh-CN" altLang="en-US"/>
           </a:p>
           <a:p>
             <a:pPr marL="0" indent="0">
@@ -4461,7 +4555,6 @@
               <a:rPr lang="zh-CN" altLang="en-US"/>
               <a:t>+------------+</a:t>
             </a:r>
-            <a:endParaRPr lang="zh-CN" altLang="en-US"/>
           </a:p>
         </p:txBody>
       </p:sp>
@@ -4470,6 +4563,13 @@
   <p:clrMapOvr>
     <a:masterClrMapping/>
   </p:clrMapOvr>
+  <p:timing>
+    <p:tnLst>
+      <p:par>
+        <p:cTn id="1" dur="indefinite" restart="never" nodeType="tmRoot"/>
+      </p:par>
+    </p:tnLst>
+  </p:timing>
 </p:sld>
 </file>
 
@@ -4482,7 +4582,14 @@
         <p:cNvGrpSpPr/>
         <p:nvPr/>
       </p:nvGrpSpPr>
-      <p:grpSpPr/>
+      <p:grpSpPr>
+        <a:xfrm>
+          <a:off x="0" y="0"/>
+          <a:ext cx="0" cy="0"/>
+          <a:chOff x="0" y="0"/>
+          <a:chExt cx="0" cy="0"/>
+        </a:xfrm>
+      </p:grpSpPr>
       <p:sp>
         <p:nvSpPr>
           <p:cNvPr id="2" name="标题 1"/>
@@ -4496,12 +4603,12 @@
         <p:spPr/>
         <p:txBody>
           <a:bodyPr/>
+          <a:lstStyle/>
           <a:p>
             <a:r>
               <a:rPr lang="en-US" altLang="zh-CN"/>
               <a:t>SQL Nested Query - op ALL</a:t>
             </a:r>
-            <a:endParaRPr lang="en-US" altLang="zh-CN"/>
           </a:p>
         </p:txBody>
       </p:sp>
@@ -4518,8 +4625,9 @@
         <p:spPr/>
         <p:txBody>
           <a:bodyPr>
-            <a:normAutofit fontScale="60000"/>
+            <a:normAutofit fontScale="67500" lnSpcReduction="10000"/>
           </a:bodyPr>
+          <a:lstStyle/>
           <a:p>
             <a:pPr marL="0" indent="0">
               <a:buNone/>
@@ -4528,7 +4636,6 @@
               <a:rPr lang="zh-CN" altLang="en-US"/>
               <a:t>/* List names of songs  if ALL are featured by the featured artist ‘Miranda Lambert’ */</a:t>
             </a:r>
-            <a:endParaRPr lang="zh-CN" altLang="en-US"/>
           </a:p>
           <a:p>
             <a:pPr marL="0" indent="0">
@@ -4538,7 +4645,6 @@
               <a:rPr lang="zh-CN" altLang="en-US"/>
               <a:t>SELECT S.sname</a:t>
             </a:r>
-            <a:endParaRPr lang="zh-CN" altLang="en-US"/>
           </a:p>
           <a:p>
             <a:pPr marL="0" indent="0">
@@ -4548,7 +4654,6 @@
               <a:rPr lang="zh-CN" altLang="en-US"/>
               <a:t>FROM song S</a:t>
             </a:r>
-            <a:endParaRPr lang="zh-CN" altLang="en-US"/>
           </a:p>
           <a:p>
             <a:pPr marL="0" indent="0">
@@ -4558,7 +4663,6 @@
               <a:rPr lang="zh-CN" altLang="en-US"/>
               <a:t>WHERE S.stranum = ALL (SELECT  F.stranum</a:t>
             </a:r>
-            <a:endParaRPr lang="zh-CN" altLang="en-US"/>
           </a:p>
           <a:p>
             <a:pPr marL="0" indent="0">
@@ -4568,7 +4672,6 @@
               <a:rPr lang="zh-CN" altLang="en-US"/>
               <a:t>                        FROM feature F</a:t>
             </a:r>
-            <a:endParaRPr lang="zh-CN" altLang="en-US"/>
           </a:p>
           <a:p>
             <a:pPr marL="0" indent="0">
@@ -4578,7 +4681,6 @@
               <a:rPr lang="zh-CN" altLang="en-US"/>
               <a:t>                        WHERE F.faname='Miranda Lambert');</a:t>
             </a:r>
-            <a:endParaRPr lang="zh-CN" altLang="en-US"/>
           </a:p>
           <a:p>
             <a:pPr marL="0" indent="0">
@@ -4594,7 +4696,6 @@
               <a:rPr lang="zh-CN" altLang="en-US"/>
               <a:t>+--------------------+</a:t>
             </a:r>
-            <a:endParaRPr lang="zh-CN" altLang="en-US"/>
           </a:p>
           <a:p>
             <a:pPr marL="0" indent="0">
@@ -4604,7 +4705,6 @@
               <a:rPr lang="zh-CN" altLang="en-US"/>
               <a:t>| sname              |</a:t>
             </a:r>
-            <a:endParaRPr lang="zh-CN" altLang="en-US"/>
           </a:p>
           <a:p>
             <a:pPr marL="0" indent="0">
@@ -4614,7 +4714,6 @@
               <a:rPr lang="zh-CN" altLang="en-US"/>
               <a:t>+--------------------+</a:t>
             </a:r>
-            <a:endParaRPr lang="zh-CN" altLang="en-US"/>
           </a:p>
           <a:p>
             <a:pPr marL="0" indent="0">
@@ -4624,7 +4723,6 @@
               <a:rPr lang="zh-CN" altLang="en-US"/>
               <a:t>| Drowns the Whiskey |</a:t>
             </a:r>
-            <a:endParaRPr lang="zh-CN" altLang="en-US"/>
           </a:p>
           <a:p>
             <a:pPr marL="0" indent="0">
@@ -4634,7 +4732,6 @@
               <a:rPr lang="zh-CN" altLang="en-US"/>
               <a:t>+--------------------+</a:t>
             </a:r>
-            <a:endParaRPr lang="zh-CN" altLang="en-US"/>
           </a:p>
         </p:txBody>
       </p:sp>
@@ -4643,6 +4740,13 @@
   <p:clrMapOvr>
     <a:masterClrMapping/>
   </p:clrMapOvr>
+  <p:timing>
+    <p:tnLst>
+      <p:par>
+        <p:cTn id="1" dur="indefinite" restart="never" nodeType="tmRoot"/>
+      </p:par>
+    </p:tnLst>
+  </p:timing>
 </p:sld>
 </file>
 
@@ -4655,7 +4759,14 @@
         <p:cNvGrpSpPr/>
         <p:nvPr/>
       </p:nvGrpSpPr>
-      <p:grpSpPr/>
+      <p:grpSpPr>
+        <a:xfrm>
+          <a:off x="0" y="0"/>
+          <a:ext cx="0" cy="0"/>
+          <a:chOff x="0" y="0"/>
+          <a:chExt cx="0" cy="0"/>
+        </a:xfrm>
+      </p:grpSpPr>
       <p:sp>
         <p:nvSpPr>
           <p:cNvPr id="2" name="标题 1"/>
@@ -4669,14 +4780,14 @@
         <p:spPr/>
         <p:txBody>
           <a:bodyPr>
-            <a:normAutofit fontScale="90000"/>
+            <a:normAutofit/>
           </a:bodyPr>
+          <a:lstStyle/>
           <a:p>
             <a:r>
               <a:rPr lang="en-US" altLang="zh-CN"/>
               <a:t>SQL Query - GROUP BY, HAVING,Aggregate Operator</a:t>
             </a:r>
-            <a:endParaRPr lang="en-US" altLang="zh-CN"/>
           </a:p>
         </p:txBody>
       </p:sp>
@@ -4693,6 +4804,7 @@
         <p:spPr/>
         <p:txBody>
           <a:bodyPr/>
+          <a:lstStyle/>
           <a:p>
             <a:pPr marL="0" indent="0">
               <a:buNone/>
@@ -4701,7 +4813,6 @@
               <a:rPr lang="zh-CN" altLang="en-US"/>
               <a:t>/* Find how many albums were released on 2018-04-13 */</a:t>
             </a:r>
-            <a:endParaRPr lang="zh-CN" altLang="en-US"/>
           </a:p>
           <a:p>
             <a:pPr marL="0" indent="0">
@@ -4711,7 +4822,6 @@
               <a:rPr lang="zh-CN" altLang="en-US"/>
               <a:t>SELECT A.date, COUNT(*)</a:t>
             </a:r>
-            <a:endParaRPr lang="zh-CN" altLang="en-US"/>
           </a:p>
           <a:p>
             <a:pPr marL="0" indent="0">
@@ -4721,7 +4831,6 @@
               <a:rPr lang="zh-CN" altLang="en-US"/>
               <a:t>FROM album A</a:t>
             </a:r>
-            <a:endParaRPr lang="zh-CN" altLang="en-US"/>
           </a:p>
           <a:p>
             <a:pPr marL="0" indent="0">
@@ -4731,7 +4840,6 @@
               <a:rPr lang="zh-CN" altLang="en-US"/>
               <a:t>GROUP BY A.date</a:t>
             </a:r>
-            <a:endParaRPr lang="zh-CN" altLang="en-US"/>
           </a:p>
           <a:p>
             <a:pPr marL="0" indent="0">
@@ -4741,7 +4849,6 @@
               <a:rPr lang="zh-CN" altLang="en-US"/>
               <a:t>HAVING A.date= '2018-04-13';</a:t>
             </a:r>
-            <a:endParaRPr lang="zh-CN" altLang="en-US"/>
           </a:p>
           <a:p>
             <a:pPr marL="0" indent="0">
@@ -4760,7 +4867,7 @@
           <p:nvPr/>
         </p:nvPicPr>
         <p:blipFill>
-          <a:blip r:embed="rId1"/>
+          <a:blip r:embed="rId2"/>
           <a:stretch>
             <a:fillRect/>
           </a:stretch>
@@ -4780,6 +4887,13 @@
   <p:clrMapOvr>
     <a:masterClrMapping/>
   </p:clrMapOvr>
+  <p:timing>
+    <p:tnLst>
+      <p:par>
+        <p:cTn id="1" dur="indefinite" restart="never" nodeType="tmRoot"/>
+      </p:par>
+    </p:tnLst>
+  </p:timing>
 </p:sld>
 </file>
 
@@ -4792,7 +4906,14 @@
         <p:cNvGrpSpPr/>
         <p:nvPr/>
       </p:nvGrpSpPr>
-      <p:grpSpPr/>
+      <p:grpSpPr>
+        <a:xfrm>
+          <a:off x="0" y="0"/>
+          <a:ext cx="0" cy="0"/>
+          <a:chOff x="0" y="0"/>
+          <a:chExt cx="0" cy="0"/>
+        </a:xfrm>
+      </p:grpSpPr>
       <p:sp>
         <p:nvSpPr>
           <p:cNvPr id="2" name="标题 1"/>
@@ -4806,12 +4927,12 @@
         <p:spPr/>
         <p:txBody>
           <a:bodyPr/>
+          <a:lstStyle/>
           <a:p>
             <a:r>
               <a:rPr lang="en-US" altLang="zh-CN"/>
               <a:t>SQL Query - GROUP BY, Aggregate Operators</a:t>
             </a:r>
-            <a:endParaRPr lang="en-US" altLang="zh-CN"/>
           </a:p>
         </p:txBody>
       </p:sp>
@@ -4828,6 +4949,7 @@
         <p:spPr/>
         <p:txBody>
           <a:bodyPr/>
+          <a:lstStyle/>
           <a:p>
             <a:pPr marL="0" indent="0">
               <a:buNone/>
@@ -4836,7 +4958,6 @@
               <a:rPr lang="zh-CN" altLang="en-US"/>
               <a:t>/* Find name of artist with the maximum songs */</a:t>
             </a:r>
-            <a:endParaRPr lang="zh-CN" altLang="en-US"/>
           </a:p>
           <a:p>
             <a:pPr marL="0" indent="0">
@@ -4846,7 +4967,6 @@
               <a:rPr lang="zh-CN" altLang="en-US"/>
               <a:t>SELECT S.aname, COUNT(S.aname)</a:t>
             </a:r>
-            <a:endParaRPr lang="zh-CN" altLang="en-US"/>
           </a:p>
           <a:p>
             <a:pPr marL="0" indent="0">
@@ -4856,7 +4976,6 @@
               <a:rPr lang="zh-CN" altLang="en-US"/>
               <a:t>FROM song S</a:t>
             </a:r>
-            <a:endParaRPr lang="zh-CN" altLang="en-US"/>
           </a:p>
           <a:p>
             <a:pPr marL="0" indent="0">
@@ -4866,7 +4985,6 @@
               <a:rPr lang="zh-CN" altLang="en-US"/>
               <a:t>GROUP BY S.aname</a:t>
             </a:r>
-            <a:endParaRPr lang="zh-CN" altLang="en-US"/>
           </a:p>
           <a:p>
             <a:pPr marL="0" indent="0">
@@ -4876,7 +4994,6 @@
               <a:rPr lang="zh-CN" altLang="en-US"/>
               <a:t>ORDER BY COUNT(S.aname) DESC</a:t>
             </a:r>
-            <a:endParaRPr lang="zh-CN" altLang="en-US"/>
           </a:p>
           <a:p>
             <a:pPr marL="0" indent="0">
@@ -4886,7 +5003,6 @@
               <a:rPr lang="zh-CN" altLang="en-US"/>
               <a:t>LIMIT 1;</a:t>
             </a:r>
-            <a:endParaRPr lang="zh-CN" altLang="en-US"/>
           </a:p>
           <a:p>
             <a:pPr marL="0" indent="0">
@@ -4905,7 +5021,7 @@
           <p:nvPr/>
         </p:nvPicPr>
         <p:blipFill>
-          <a:blip r:embed="rId1"/>
+          <a:blip r:embed="rId2"/>
           <a:stretch>
             <a:fillRect/>
           </a:stretch>
@@ -4925,6 +5041,13 @@
   <p:clrMapOvr>
     <a:masterClrMapping/>
   </p:clrMapOvr>
+  <p:timing>
+    <p:tnLst>
+      <p:par>
+        <p:cTn id="1" dur="indefinite" restart="never" nodeType="tmRoot"/>
+      </p:par>
+    </p:tnLst>
+  </p:timing>
 </p:sld>
 </file>
 
@@ -4937,7 +5060,14 @@
         <p:cNvGrpSpPr/>
         <p:nvPr/>
       </p:nvGrpSpPr>
-      <p:grpSpPr/>
+      <p:grpSpPr>
+        <a:xfrm>
+          <a:off x="0" y="0"/>
+          <a:ext cx="0" cy="0"/>
+          <a:chOff x="0" y="0"/>
+          <a:chExt cx="0" cy="0"/>
+        </a:xfrm>
+      </p:grpSpPr>
       <p:sp>
         <p:nvSpPr>
           <p:cNvPr id="2" name="标题 1"/>
@@ -4951,14 +5081,14 @@
         <p:spPr/>
         <p:txBody>
           <a:bodyPr>
-            <a:normAutofit fontScale="90000"/>
+            <a:normAutofit/>
           </a:bodyPr>
+          <a:lstStyle/>
           <a:p>
             <a:r>
               <a:rPr lang="en-US" altLang="zh-CN"/>
               <a:t>SQL Query - GROUP BY,HAVING, Aggregate Operators</a:t>
             </a:r>
-            <a:endParaRPr lang="en-US" altLang="zh-CN"/>
           </a:p>
         </p:txBody>
       </p:sp>
@@ -4977,6 +5107,7 @@
           <a:bodyPr>
             <a:normAutofit lnSpcReduction="10000"/>
           </a:bodyPr>
+          <a:lstStyle/>
           <a:p>
             <a:pPr marL="0" indent="0">
               <a:buNone/>
@@ -4985,7 +5116,6 @@
               <a:rPr lang="zh-CN" altLang="en-US"/>
               <a:t>/* Find artists who have more songs than one artist called “Chris Stapleton”. */</a:t>
             </a:r>
-            <a:endParaRPr lang="zh-CN" altLang="en-US"/>
           </a:p>
           <a:p>
             <a:pPr marL="0" indent="0">
@@ -4995,7 +5125,6 @@
               <a:rPr lang="zh-CN" altLang="en-US"/>
               <a:t>SELECT S.aname, COUNT(S.aname)</a:t>
             </a:r>
-            <a:endParaRPr lang="zh-CN" altLang="en-US"/>
           </a:p>
           <a:p>
             <a:pPr marL="0" indent="0">
@@ -5005,7 +5134,6 @@
               <a:rPr lang="zh-CN" altLang="en-US"/>
               <a:t>FROM song S</a:t>
             </a:r>
-            <a:endParaRPr lang="zh-CN" altLang="en-US"/>
           </a:p>
           <a:p>
             <a:pPr marL="0" indent="0">
@@ -5015,7 +5143,6 @@
               <a:rPr lang="zh-CN" altLang="en-US"/>
               <a:t>GROUP BY S.aname</a:t>
             </a:r>
-            <a:endParaRPr lang="zh-CN" altLang="en-US"/>
           </a:p>
           <a:p>
             <a:pPr marL="0" indent="0">
@@ -5025,7 +5152,6 @@
               <a:rPr lang="zh-CN" altLang="en-US"/>
               <a:t>HAVING COUNT(S.aname) &gt; (SELECT COUNT(S2.aname)</a:t>
             </a:r>
-            <a:endParaRPr lang="zh-CN" altLang="en-US"/>
           </a:p>
           <a:p>
             <a:pPr marL="0" indent="0">
@@ -5035,7 +5161,6 @@
               <a:rPr lang="zh-CN" altLang="en-US"/>
               <a:t>						 FROM song S2</a:t>
             </a:r>
-            <a:endParaRPr lang="zh-CN" altLang="en-US"/>
           </a:p>
           <a:p>
             <a:pPr marL="0" indent="0">
@@ -5045,7 +5170,6 @@
               <a:rPr lang="zh-CN" altLang="en-US"/>
               <a:t>                         WHERE S2.aname = 'Chris Stapleton')</a:t>
             </a:r>
-            <a:endParaRPr lang="zh-CN" altLang="en-US"/>
           </a:p>
           <a:p>
             <a:pPr marL="0" indent="0">
@@ -5055,7 +5179,6 @@
               <a:rPr lang="zh-CN" altLang="en-US"/>
               <a:t>ORDER BY COUNT(S.aname) DESC;</a:t>
             </a:r>
-            <a:endParaRPr lang="zh-CN" altLang="en-US"/>
           </a:p>
         </p:txBody>
       </p:sp>
@@ -5068,7 +5191,7 @@
           <p:nvPr/>
         </p:nvPicPr>
         <p:blipFill>
-          <a:blip r:embed="rId1"/>
+          <a:blip r:embed="rId2"/>
           <a:stretch>
             <a:fillRect/>
           </a:stretch>
@@ -5088,6 +5211,13 @@
   <p:clrMapOvr>
     <a:masterClrMapping/>
   </p:clrMapOvr>
+  <p:timing>
+    <p:tnLst>
+      <p:par>
+        <p:cTn id="1" dur="indefinite" restart="never" nodeType="tmRoot"/>
+      </p:par>
+    </p:tnLst>
+  </p:timing>
 </p:sld>
 </file>
 
@@ -5100,7 +5230,14 @@
         <p:cNvGrpSpPr/>
         <p:nvPr/>
       </p:nvGrpSpPr>
-      <p:grpSpPr/>
+      <p:grpSpPr>
+        <a:xfrm>
+          <a:off x="0" y="0"/>
+          <a:ext cx="0" cy="0"/>
+          <a:chOff x="0" y="0"/>
+          <a:chExt cx="0" cy="0"/>
+        </a:xfrm>
+      </p:grpSpPr>
       <p:sp>
         <p:nvSpPr>
           <p:cNvPr id="2" name="标题 1"/>
@@ -5114,14 +5251,14 @@
         <p:spPr/>
         <p:txBody>
           <a:bodyPr>
-            <a:normAutofit fontScale="90000"/>
+            <a:normAutofit/>
           </a:bodyPr>
+          <a:lstStyle/>
           <a:p>
             <a:r>
               <a:rPr lang="en-US" altLang="zh-CN"/>
               <a:t>SQL Query - GROUP BY,HAVING,Aggregate Operators</a:t>
             </a:r>
-            <a:endParaRPr lang="en-US" altLang="zh-CN"/>
           </a:p>
         </p:txBody>
       </p:sp>
@@ -5138,8 +5275,9 @@
         <p:spPr/>
         <p:txBody>
           <a:bodyPr>
-            <a:normAutofit fontScale="30000"/>
+            <a:normAutofit fontScale="37500" lnSpcReduction="10000"/>
           </a:bodyPr>
+          <a:lstStyle/>
           <a:p>
             <a:pPr marL="0" indent="0">
               <a:buNone/>
@@ -5148,7 +5286,6 @@
               <a:rPr lang="zh-CN" altLang="en-US"/>
               <a:t>/* Find albums that have more than ten songs */</a:t>
             </a:r>
-            <a:endParaRPr lang="zh-CN" altLang="en-US"/>
           </a:p>
           <a:p>
             <a:pPr marL="0" indent="0">
@@ -5158,7 +5295,6 @@
               <a:rPr lang="zh-CN" altLang="en-US"/>
               <a:t>SELECT A.abname, COUNT(C.stranum) AS song_number</a:t>
             </a:r>
-            <a:endParaRPr lang="zh-CN" altLang="en-US"/>
           </a:p>
           <a:p>
             <a:pPr marL="0" indent="0">
@@ -5168,7 +5304,6 @@
               <a:rPr lang="zh-CN" altLang="en-US"/>
               <a:t>FROM album A, song S, composed_of C</a:t>
             </a:r>
-            <a:endParaRPr lang="zh-CN" altLang="en-US"/>
           </a:p>
           <a:p>
             <a:pPr marL="0" indent="0">
@@ -5178,7 +5313,6 @@
               <a:rPr lang="zh-CN" altLang="en-US"/>
               <a:t>WHERE A.abtranum = C.abtranum AND</a:t>
             </a:r>
-            <a:endParaRPr lang="zh-CN" altLang="en-US"/>
           </a:p>
           <a:p>
             <a:pPr marL="0" indent="0">
@@ -5188,7 +5322,6 @@
               <a:rPr lang="zh-CN" altLang="en-US"/>
               <a:t>	      C.stranum = S.stranum</a:t>
             </a:r>
-            <a:endParaRPr lang="zh-CN" altLang="en-US"/>
           </a:p>
           <a:p>
             <a:pPr marL="0" indent="0">
@@ -5198,7 +5331,6 @@
               <a:rPr lang="zh-CN" altLang="en-US"/>
               <a:t>GROUP BY A.abname</a:t>
             </a:r>
-            <a:endParaRPr lang="zh-CN" altLang="en-US"/>
           </a:p>
           <a:p>
             <a:pPr marL="0" indent="0">
@@ -5208,7 +5340,6 @@
               <a:rPr lang="zh-CN" altLang="en-US"/>
               <a:t>HAVING COUNT(C.stranum)&gt;10                                      </a:t>
             </a:r>
-            <a:endParaRPr lang="zh-CN" altLang="en-US"/>
           </a:p>
           <a:p>
             <a:pPr marL="0" indent="0">
@@ -5218,7 +5349,6 @@
               <a:rPr lang="zh-CN" altLang="en-US"/>
               <a:t>+-------------------+-------------+</a:t>
             </a:r>
-            <a:endParaRPr lang="zh-CN" altLang="en-US"/>
           </a:p>
           <a:p>
             <a:pPr marL="0" indent="0">
@@ -5228,7 +5358,6 @@
               <a:rPr lang="zh-CN" altLang="en-US"/>
               <a:t>| abname            | song_number |</a:t>
             </a:r>
-            <a:endParaRPr lang="zh-CN" altLang="en-US"/>
           </a:p>
           <a:p>
             <a:pPr marL="0" indent="0">
@@ -5238,7 +5367,6 @@
               <a:rPr lang="zh-CN" altLang="en-US"/>
               <a:t>+-------------------+-------------+</a:t>
             </a:r>
-            <a:endParaRPr lang="zh-CN" altLang="en-US"/>
           </a:p>
           <a:p>
             <a:pPr marL="0" indent="0">
@@ -5248,7 +5376,6 @@
               <a:rPr lang="zh-CN" altLang="en-US"/>
               <a:t>| Evolve            |          12 |</a:t>
             </a:r>
-            <a:endParaRPr lang="zh-CN" altLang="en-US"/>
           </a:p>
           <a:p>
             <a:pPr marL="0" indent="0">
@@ -5258,7 +5385,6 @@
               <a:rPr lang="zh-CN" altLang="en-US"/>
               <a:t>| Fair and Square   |          14 |</a:t>
             </a:r>
-            <a:endParaRPr lang="zh-CN" altLang="en-US"/>
           </a:p>
           <a:p>
             <a:pPr marL="0" indent="0">
@@ -5268,7 +5394,6 @@
               <a:rPr lang="zh-CN" altLang="en-US"/>
               <a:t>| Rearview Town     |          15 |</a:t>
             </a:r>
-            <a:endParaRPr lang="zh-CN" altLang="en-US"/>
           </a:p>
           <a:p>
             <a:pPr marL="0" indent="0">
@@ -5278,7 +5403,6 @@
               <a:rPr lang="zh-CN" altLang="en-US"/>
               <a:t>| There Is More     |          17 |</a:t>
             </a:r>
-            <a:endParaRPr lang="zh-CN" altLang="en-US"/>
           </a:p>
           <a:p>
             <a:pPr marL="0" indent="0">
@@ -5288,7 +5412,6 @@
               <a:rPr lang="zh-CN" altLang="en-US"/>
               <a:t>| They Don’t Know   |          15 |</a:t>
             </a:r>
-            <a:endParaRPr lang="zh-CN" altLang="en-US"/>
           </a:p>
           <a:p>
             <a:pPr marL="0" indent="0">
@@ -5298,7 +5421,6 @@
               <a:rPr lang="zh-CN" altLang="en-US"/>
               <a:t>+-------------------+-------------+   </a:t>
             </a:r>
-            <a:endParaRPr lang="zh-CN" altLang="en-US"/>
           </a:p>
           <a:p>
             <a:pPr marL="0" indent="0">
@@ -5313,6 +5435,13 @@
   <p:clrMapOvr>
     <a:masterClrMapping/>
   </p:clrMapOvr>
+  <p:timing>
+    <p:tnLst>
+      <p:par>
+        <p:cTn id="1" dur="indefinite" restart="never" nodeType="tmRoot"/>
+      </p:par>
+    </p:tnLst>
+  </p:timing>
 </p:sld>
 </file>
 
@@ -5325,7 +5454,14 @@
         <p:cNvGrpSpPr/>
         <p:nvPr/>
       </p:nvGrpSpPr>
-      <p:grpSpPr/>
+      <p:grpSpPr>
+        <a:xfrm>
+          <a:off x="0" y="0"/>
+          <a:ext cx="0" cy="0"/>
+          <a:chOff x="0" y="0"/>
+          <a:chExt cx="0" cy="0"/>
+        </a:xfrm>
+      </p:grpSpPr>
       <p:sp>
         <p:nvSpPr>
           <p:cNvPr id="2" name="标题 1"/>
@@ -5339,30 +5475,202 @@
         <p:spPr/>
         <p:txBody>
           <a:bodyPr/>
-          <a:p>
-            <a:r>
-              <a:rPr lang="en-US" altLang="zh-CN"/>
-              <a:t>Web Application for database</a:t>
-            </a:r>
-            <a:endParaRPr lang="en-US" altLang="zh-CN"/>
-          </a:p>
-        </p:txBody>
-      </p:sp>
-      <p:sp>
-        <p:nvSpPr>
-          <p:cNvPr id="3" name="内容占位符 2"/>
-          <p:cNvSpPr>
-            <a:spLocks noGrp="1"/>
-          </p:cNvSpPr>
+          <a:lstStyle/>
+          <a:p>
+            <a:r>
+              <a:rPr lang="en-US" altLang="zh-CN" dirty="0"/>
+              <a:t>Web Application for </a:t>
+            </a:r>
+            <a:r>
+              <a:rPr lang="en-US" altLang="zh-CN" dirty="0" smtClean="0"/>
+              <a:t>database - </a:t>
+            </a:r>
+            <a:r>
+              <a:rPr lang="en-US" altLang="zh-CN" dirty="0" err="1" smtClean="0"/>
+              <a:t>Spotiqualize</a:t>
+            </a:r>
+            <a:endParaRPr lang="en-US" altLang="zh-CN" dirty="0"/>
+          </a:p>
+        </p:txBody>
+      </p:sp>
+      <p:pic>
+        <p:nvPicPr>
+          <p:cNvPr id="6" name="Content Placeholder 5"/>
+          <p:cNvPicPr>
+            <a:picLocks noGrp="1" noChangeAspect="1"/>
+          </p:cNvPicPr>
           <p:nvPr>
             <p:ph idx="1"/>
           </p:nvPr>
-        </p:nvSpPr>
-        <p:spPr/>
-        <p:txBody>
-          <a:bodyPr/>
-          <a:p>
-            <a:endParaRPr lang="zh-CN" altLang="en-US"/>
+        </p:nvPicPr>
+        <p:blipFill>
+          <a:blip r:embed="rId2" cstate="print">
+            <a:extLst>
+              <a:ext uri="{28A0092B-C50C-407E-A947-70E740481C1C}">
+                <a14:useLocalDpi xmlns:a14="http://schemas.microsoft.com/office/drawing/2010/main" val="0"/>
+              </a:ext>
+            </a:extLst>
+          </a:blip>
+          <a:stretch>
+            <a:fillRect/>
+          </a:stretch>
+        </p:blipFill>
+        <p:spPr>
+          <a:xfrm>
+            <a:off x="1359599" y="1730216"/>
+            <a:ext cx="2330349" cy="4351338"/>
+          </a:xfrm>
+        </p:spPr>
+      </p:pic>
+      <p:sp>
+        <p:nvSpPr>
+          <p:cNvPr id="7" name="TextBox 6"/>
+          <p:cNvSpPr txBox="1"/>
+          <p:nvPr/>
+        </p:nvSpPr>
+        <p:spPr>
+          <a:xfrm>
+            <a:off x="4096512" y="1730216"/>
+            <a:ext cx="5477256" cy="369332"/>
+          </a:xfrm>
+          <a:prstGeom prst="rect">
+            <a:avLst/>
+          </a:prstGeom>
+          <a:noFill/>
+        </p:spPr>
+        <p:txBody>
+          <a:bodyPr wrap="square" rtlCol="0">
+            <a:spAutoFit/>
+          </a:bodyPr>
+          <a:lstStyle/>
+          <a:p>
+            <a:r>
+              <a:rPr lang="en-US" dirty="0" smtClean="0"/>
+              <a:t>Song DB section shows all the songs</a:t>
+            </a:r>
+            <a:endParaRPr lang="en-US" dirty="0"/>
+          </a:p>
+        </p:txBody>
+      </p:sp>
+      <p:sp>
+        <p:nvSpPr>
+          <p:cNvPr id="8" name="TextBox 7"/>
+          <p:cNvSpPr txBox="1"/>
+          <p:nvPr/>
+        </p:nvSpPr>
+        <p:spPr>
+          <a:xfrm>
+            <a:off x="4096512" y="2139076"/>
+            <a:ext cx="6949440" cy="369332"/>
+          </a:xfrm>
+          <a:prstGeom prst="rect">
+            <a:avLst/>
+          </a:prstGeom>
+          <a:noFill/>
+        </p:spPr>
+        <p:txBody>
+          <a:bodyPr wrap="square" rtlCol="0">
+            <a:spAutoFit/>
+          </a:bodyPr>
+          <a:lstStyle/>
+          <a:p>
+            <a:r>
+              <a:rPr lang="en-US" dirty="0" smtClean="0"/>
+              <a:t>Artist DB shows the Artist model associated with the Song model</a:t>
+            </a:r>
+            <a:endParaRPr lang="en-US" dirty="0"/>
+          </a:p>
+        </p:txBody>
+      </p:sp>
+      <p:sp>
+        <p:nvSpPr>
+          <p:cNvPr id="9" name="TextBox 8"/>
+          <p:cNvSpPr txBox="1"/>
+          <p:nvPr/>
+        </p:nvSpPr>
+        <p:spPr>
+          <a:xfrm>
+            <a:off x="4096512" y="2633630"/>
+            <a:ext cx="7324344" cy="646331"/>
+          </a:xfrm>
+          <a:prstGeom prst="rect">
+            <a:avLst/>
+          </a:prstGeom>
+          <a:noFill/>
+        </p:spPr>
+        <p:txBody>
+          <a:bodyPr wrap="square" rtlCol="0">
+            <a:spAutoFit/>
+          </a:bodyPr>
+          <a:lstStyle/>
+          <a:p>
+            <a:r>
+              <a:rPr lang="en-US" dirty="0"/>
+              <a:t>Album DB shows the Album model associated with the Song model</a:t>
+            </a:r>
+          </a:p>
+          <a:p>
+            <a:endParaRPr lang="en-US" dirty="0"/>
+          </a:p>
+        </p:txBody>
+      </p:sp>
+      <p:pic>
+        <p:nvPicPr>
+          <p:cNvPr id="10" name="Picture 9"/>
+          <p:cNvPicPr>
+            <a:picLocks noChangeAspect="1"/>
+          </p:cNvPicPr>
+          <p:nvPr/>
+        </p:nvPicPr>
+        <p:blipFill>
+          <a:blip r:embed="rId3">
+            <a:extLst>
+              <a:ext uri="{28A0092B-C50C-407E-A947-70E740481C1C}">
+                <a14:useLocalDpi xmlns:a14="http://schemas.microsoft.com/office/drawing/2010/main" val="0"/>
+              </a:ext>
+            </a:extLst>
+          </a:blip>
+          <a:stretch>
+            <a:fillRect/>
+          </a:stretch>
+        </p:blipFill>
+        <p:spPr>
+          <a:xfrm>
+            <a:off x="3880981" y="3241054"/>
+            <a:ext cx="3590192" cy="2840500"/>
+          </a:xfrm>
+          <a:prstGeom prst="rect">
+            <a:avLst/>
+          </a:prstGeom>
+        </p:spPr>
+      </p:pic>
+      <p:sp>
+        <p:nvSpPr>
+          <p:cNvPr id="11" name="TextBox 10"/>
+          <p:cNvSpPr txBox="1"/>
+          <p:nvPr/>
+        </p:nvSpPr>
+        <p:spPr>
+          <a:xfrm>
+            <a:off x="7758684" y="4142232"/>
+            <a:ext cx="3776472" cy="646331"/>
+          </a:xfrm>
+          <a:prstGeom prst="rect">
+            <a:avLst/>
+          </a:prstGeom>
+          <a:noFill/>
+        </p:spPr>
+        <p:txBody>
+          <a:bodyPr wrap="square" rtlCol="0">
+            <a:spAutoFit/>
+          </a:bodyPr>
+          <a:lstStyle/>
+          <a:p>
+            <a:r>
+              <a:rPr lang="en-US" dirty="0" smtClean="0"/>
+              <a:t>You can add any song here + a pic of the album</a:t>
+            </a:r>
+            <a:endParaRPr lang="en-US" dirty="0"/>
           </a:p>
         </p:txBody>
       </p:sp>
@@ -5371,6 +5679,13 @@
   <p:clrMapOvr>
     <a:masterClrMapping/>
   </p:clrMapOvr>
+  <p:timing>
+    <p:tnLst>
+      <p:par>
+        <p:cTn id="1" dur="indefinite" restart="never" nodeType="tmRoot"/>
+      </p:par>
+    </p:tnLst>
+  </p:timing>
 </p:sld>
 </file>
 
@@ -5383,7 +5698,14 @@
         <p:cNvGrpSpPr/>
         <p:nvPr/>
       </p:nvGrpSpPr>
-      <p:grpSpPr/>
+      <p:grpSpPr>
+        <a:xfrm>
+          <a:off x="0" y="0"/>
+          <a:ext cx="0" cy="0"/>
+          <a:chOff x="0" y="0"/>
+          <a:chExt cx="0" cy="0"/>
+        </a:xfrm>
+      </p:grpSpPr>
       <p:sp>
         <p:nvSpPr>
           <p:cNvPr id="2" name="标题 1"/>
@@ -5397,12 +5719,12 @@
         <p:spPr/>
         <p:txBody>
           <a:bodyPr/>
+          <a:lstStyle/>
           <a:p>
             <a:r>
               <a:rPr lang="en-US" altLang="zh-CN"/>
               <a:t>ER Diagram</a:t>
             </a:r>
-            <a:endParaRPr lang="en-US" altLang="zh-CN"/>
           </a:p>
         </p:txBody>
       </p:sp>
@@ -5419,8 +5741,9 @@
         <p:spPr/>
         <p:txBody>
           <a:bodyPr>
-            <a:normAutofit fontScale="25000"/>
+            <a:normAutofit fontScale="25000" lnSpcReduction="20000"/>
           </a:bodyPr>
+          <a:lstStyle/>
           <a:p>
             <a:endParaRPr lang="zh-CN" altLang="en-US"/>
           </a:p>
@@ -5546,7 +5869,6 @@
               <a:rPr lang="zh-CN" altLang="en-US"/>
               <a:t>	</a:t>
             </a:r>
-            <a:endParaRPr lang="zh-CN" altLang="en-US"/>
           </a:p>
           <a:p>
             <a:pPr marL="0" indent="0">
@@ -5643,7 +5965,6 @@
               <a:rPr lang="zh-CN" altLang="en-US"/>
               <a:t>	</a:t>
             </a:r>
-            <a:endParaRPr lang="zh-CN" altLang="en-US"/>
           </a:p>
           <a:p>
             <a:endParaRPr lang="zh-CN" altLang="en-US"/>
@@ -5699,13 +6020,13 @@
         </p:style>
         <p:txBody>
           <a:bodyPr rtlCol="0" anchor="ctr"/>
+          <a:lstStyle/>
           <a:p>
             <a:pPr algn="ctr"/>
             <a:r>
               <a:rPr lang="en-US" altLang="zh-CN"/>
               <a:t>artists</a:t>
             </a:r>
-            <a:endParaRPr lang="en-US" altLang="zh-CN"/>
           </a:p>
         </p:txBody>
       </p:sp>
@@ -5740,13 +6061,13 @@
         </p:style>
         <p:txBody>
           <a:bodyPr rtlCol="0" anchor="ctr"/>
+          <a:lstStyle/>
           <a:p>
             <a:pPr algn="ctr"/>
             <a:r>
               <a:rPr lang="en-US" altLang="zh-CN" u="sng"/>
               <a:t>aname</a:t>
             </a:r>
-            <a:endParaRPr lang="en-US" altLang="zh-CN" u="sng"/>
           </a:p>
         </p:txBody>
       </p:sp>
@@ -5781,13 +6102,13 @@
         </p:style>
         <p:txBody>
           <a:bodyPr rtlCol="0" anchor="ctr"/>
+          <a:lstStyle/>
           <a:p>
             <a:pPr algn="ctr"/>
             <a:r>
               <a:rPr lang="en-US" altLang="zh-CN"/>
               <a:t>writes</a:t>
             </a:r>
-            <a:endParaRPr lang="en-US" altLang="zh-CN"/>
           </a:p>
         </p:txBody>
       </p:sp>
@@ -5822,13 +6143,13 @@
         </p:style>
         <p:txBody>
           <a:bodyPr rtlCol="0" anchor="ctr"/>
+          <a:lstStyle/>
           <a:p>
             <a:pPr algn="ctr"/>
             <a:r>
               <a:rPr lang="en-US" altLang="zh-CN"/>
               <a:t>songs</a:t>
             </a:r>
-            <a:endParaRPr lang="en-US" altLang="zh-CN"/>
           </a:p>
         </p:txBody>
       </p:sp>
@@ -5863,13 +6184,13 @@
         </p:style>
         <p:txBody>
           <a:bodyPr rtlCol="0" anchor="ctr"/>
+          <a:lstStyle/>
           <a:p>
             <a:pPr algn="ctr"/>
             <a:r>
               <a:rPr lang="en-US" altLang="zh-CN"/>
               <a:t>sname</a:t>
             </a:r>
-            <a:endParaRPr lang="en-US" altLang="zh-CN"/>
           </a:p>
         </p:txBody>
       </p:sp>
@@ -5904,13 +6225,13 @@
         </p:style>
         <p:txBody>
           <a:bodyPr rtlCol="0" anchor="ctr"/>
+          <a:lstStyle/>
           <a:p>
             <a:pPr algn="ctr"/>
             <a:r>
               <a:rPr lang="en-US" altLang="zh-CN" u="sng"/>
               <a:t>stranum</a:t>
             </a:r>
-            <a:endParaRPr lang="en-US" altLang="zh-CN" u="sng"/>
           </a:p>
         </p:txBody>
       </p:sp>
@@ -5945,13 +6266,13 @@
         </p:style>
         <p:txBody>
           <a:bodyPr rtlCol="0" anchor="ctr"/>
+          <a:lstStyle/>
           <a:p>
             <a:pPr algn="ctr"/>
             <a:r>
               <a:rPr lang="en-US" altLang="zh-CN"/>
               <a:t>feature</a:t>
             </a:r>
-            <a:endParaRPr lang="en-US" altLang="zh-CN"/>
           </a:p>
         </p:txBody>
       </p:sp>
@@ -5986,13 +6307,13 @@
         </p:style>
         <p:txBody>
           <a:bodyPr rtlCol="0" anchor="ctr"/>
+          <a:lstStyle/>
           <a:p>
             <a:pPr algn="ctr"/>
             <a:r>
               <a:rPr lang="en-US" altLang="zh-CN"/>
               <a:t>featured artists</a:t>
             </a:r>
-            <a:endParaRPr lang="en-US" altLang="zh-CN"/>
           </a:p>
         </p:txBody>
       </p:sp>
@@ -6027,13 +6348,13 @@
         </p:style>
         <p:txBody>
           <a:bodyPr rtlCol="0" anchor="ctr"/>
+          <a:lstStyle/>
           <a:p>
             <a:pPr algn="ctr"/>
             <a:r>
               <a:rPr lang="en-US" altLang="zh-CN" u="sng"/>
               <a:t>faname</a:t>
             </a:r>
-            <a:endParaRPr lang="en-US" altLang="zh-CN" u="sng"/>
           </a:p>
         </p:txBody>
       </p:sp>
@@ -6068,13 +6389,13 @@
         </p:style>
         <p:txBody>
           <a:bodyPr rtlCol="0" anchor="ctr"/>
+          <a:lstStyle/>
           <a:p>
             <a:pPr algn="ctr"/>
             <a:r>
               <a:rPr lang="en-US" altLang="zh-CN"/>
               <a:t>composed of</a:t>
             </a:r>
-            <a:endParaRPr lang="en-US" altLang="zh-CN"/>
           </a:p>
         </p:txBody>
       </p:sp>
@@ -6109,13 +6430,13 @@
         </p:style>
         <p:txBody>
           <a:bodyPr rtlCol="0" anchor="ctr"/>
+          <a:lstStyle/>
           <a:p>
             <a:pPr algn="ctr"/>
             <a:r>
               <a:rPr lang="en-US" altLang="zh-CN"/>
               <a:t>releases</a:t>
             </a:r>
-            <a:endParaRPr lang="en-US" altLang="zh-CN"/>
           </a:p>
         </p:txBody>
       </p:sp>
@@ -6150,13 +6471,13 @@
         </p:style>
         <p:txBody>
           <a:bodyPr rtlCol="0" anchor="ctr"/>
+          <a:lstStyle/>
           <a:p>
             <a:pPr algn="ctr"/>
             <a:r>
               <a:rPr lang="en-US" altLang="zh-CN"/>
               <a:t>album</a:t>
             </a:r>
-            <a:endParaRPr lang="en-US" altLang="zh-CN"/>
           </a:p>
         </p:txBody>
       </p:sp>
@@ -6191,13 +6512,13 @@
         </p:style>
         <p:txBody>
           <a:bodyPr rtlCol="0" anchor="ctr"/>
+          <a:lstStyle/>
           <a:p>
             <a:pPr algn="ctr"/>
             <a:r>
               <a:rPr lang="en-US" altLang="zh-CN"/>
               <a:t>abname</a:t>
             </a:r>
-            <a:endParaRPr lang="en-US" altLang="zh-CN"/>
           </a:p>
         </p:txBody>
       </p:sp>
@@ -6232,13 +6553,13 @@
         </p:style>
         <p:txBody>
           <a:bodyPr rtlCol="0" anchor="ctr"/>
+          <a:lstStyle/>
           <a:p>
             <a:pPr algn="ctr"/>
             <a:r>
               <a:rPr lang="en-US" altLang="zh-CN"/>
               <a:t>date</a:t>
             </a:r>
-            <a:endParaRPr lang="en-US" altLang="zh-CN"/>
           </a:p>
         </p:txBody>
       </p:sp>
@@ -6273,13 +6594,13 @@
         </p:style>
         <p:txBody>
           <a:bodyPr rtlCol="0" anchor="ctr"/>
+          <a:lstStyle/>
           <a:p>
             <a:pPr algn="ctr"/>
             <a:r>
               <a:rPr lang="en-US" altLang="zh-CN" u="sng"/>
               <a:t>abtranum</a:t>
             </a:r>
-            <a:endParaRPr lang="en-US" altLang="zh-CN" u="sng"/>
           </a:p>
         </p:txBody>
       </p:sp>
@@ -6817,6 +7138,13 @@
   <p:clrMapOvr>
     <a:masterClrMapping/>
   </p:clrMapOvr>
+  <p:timing>
+    <p:tnLst>
+      <p:par>
+        <p:cTn id="1" dur="indefinite" restart="never" nodeType="tmRoot"/>
+      </p:par>
+    </p:tnLst>
+  </p:timing>
 </p:sld>
 </file>
 
@@ -6829,7 +7157,14 @@
         <p:cNvGrpSpPr/>
         <p:nvPr/>
       </p:nvGrpSpPr>
-      <p:grpSpPr/>
+      <p:grpSpPr>
+        <a:xfrm>
+          <a:off x="0" y="0"/>
+          <a:ext cx="0" cy="0"/>
+          <a:chOff x="0" y="0"/>
+          <a:chExt cx="0" cy="0"/>
+        </a:xfrm>
+      </p:grpSpPr>
       <p:sp>
         <p:nvSpPr>
           <p:cNvPr id="2" name="标题 1"/>
@@ -6843,12 +7178,12 @@
         <p:spPr/>
         <p:txBody>
           <a:bodyPr/>
+          <a:lstStyle/>
           <a:p>
             <a:r>
               <a:rPr lang="en-US" altLang="zh-CN"/>
               <a:t>Project Implementation</a:t>
             </a:r>
-            <a:endParaRPr lang="en-US" altLang="zh-CN"/>
           </a:p>
         </p:txBody>
       </p:sp>
@@ -6867,6 +7202,7 @@
           <a:bodyPr>
             <a:noAutofit/>
           </a:bodyPr>
+          <a:lstStyle/>
           <a:p>
             <a:r>
               <a:rPr lang="en-US" altLang="zh-CN" sz="1400">
@@ -6875,10 +7211,6 @@
               </a:rPr>
               <a:t>Create the database for the project:</a:t>
             </a:r>
-            <a:endParaRPr lang="en-US" altLang="zh-CN" sz="1400">
-              <a:latin typeface="Times New Roman" panose="02020603050405020304" charset="0"/>
-              <a:cs typeface="Times New Roman" panose="02020603050405020304" charset="0"/>
-            </a:endParaRPr>
           </a:p>
           <a:p>
             <a:pPr marL="0" indent="0">
@@ -6891,10 +7223,6 @@
               </a:rPr>
               <a:t>   CREATE DATABASE music_app;</a:t>
             </a:r>
-            <a:endParaRPr lang="en-US" altLang="zh-CN" sz="1400">
-              <a:latin typeface="Times New Roman" panose="02020603050405020304" charset="0"/>
-              <a:cs typeface="Times New Roman" panose="02020603050405020304" charset="0"/>
-            </a:endParaRPr>
           </a:p>
           <a:p>
             <a:pPr marL="0" indent="0">
@@ -6907,10 +7235,6 @@
               </a:rPr>
               <a:t>   USE music_app;</a:t>
             </a:r>
-            <a:endParaRPr lang="en-US" altLang="zh-CN" sz="1400">
-              <a:latin typeface="Times New Roman" panose="02020603050405020304" charset="0"/>
-              <a:cs typeface="Times New Roman" panose="02020603050405020304" charset="0"/>
-            </a:endParaRPr>
           </a:p>
           <a:p>
             <a:r>
@@ -6920,10 +7244,6 @@
               </a:rPr>
               <a:t>Create four tables of entities:</a:t>
             </a:r>
-            <a:endParaRPr lang="en-US" altLang="zh-CN" sz="1400">
-              <a:latin typeface="Times New Roman" panose="02020603050405020304" charset="0"/>
-              <a:cs typeface="Times New Roman" panose="02020603050405020304" charset="0"/>
-            </a:endParaRPr>
           </a:p>
           <a:p>
             <a:pPr marL="0" indent="0">
@@ -6936,10 +7256,6 @@
               </a:rPr>
               <a:t>   artist, song, album, featured_artist</a:t>
             </a:r>
-            <a:endParaRPr lang="en-US" altLang="zh-CN" sz="1400">
-              <a:latin typeface="Times New Roman" panose="02020603050405020304" charset="0"/>
-              <a:cs typeface="Times New Roman" panose="02020603050405020304" charset="0"/>
-            </a:endParaRPr>
           </a:p>
           <a:p>
             <a:r>
@@ -6949,10 +7265,6 @@
               </a:rPr>
               <a:t>Create three tables of relations:</a:t>
             </a:r>
-            <a:endParaRPr lang="en-US" altLang="zh-CN" sz="1400">
-              <a:latin typeface="Times New Roman" panose="02020603050405020304" charset="0"/>
-              <a:cs typeface="Times New Roman" panose="02020603050405020304" charset="0"/>
-            </a:endParaRPr>
           </a:p>
           <a:p>
             <a:pPr marL="0" indent="0">
@@ -6965,10 +7277,6 @@
               </a:rPr>
               <a:t>    composed_of, releases, feature</a:t>
             </a:r>
-            <a:endParaRPr lang="en-US" altLang="zh-CN" sz="1400">
-              <a:latin typeface="Times New Roman" panose="02020603050405020304" charset="0"/>
-              <a:cs typeface="Times New Roman" panose="02020603050405020304" charset="0"/>
-            </a:endParaRPr>
           </a:p>
           <a:p>
             <a:r>
@@ -6978,10 +7286,6 @@
               </a:rPr>
               <a:t>Create two indexes</a:t>
             </a:r>
-            <a:endParaRPr lang="en-US" altLang="zh-CN" sz="1400">
-              <a:latin typeface="Times New Roman" panose="02020603050405020304" charset="0"/>
-              <a:cs typeface="Times New Roman" panose="02020603050405020304" charset="0"/>
-            </a:endParaRPr>
           </a:p>
           <a:p>
             <a:r>
@@ -6991,10 +7295,6 @@
               </a:rPr>
               <a:t>Create two views</a:t>
             </a:r>
-            <a:endParaRPr lang="en-US" altLang="zh-CN" sz="1400">
-              <a:latin typeface="Times New Roman" panose="02020603050405020304" charset="0"/>
-              <a:cs typeface="Times New Roman" panose="02020603050405020304" charset="0"/>
-            </a:endParaRPr>
           </a:p>
           <a:p>
             <a:r>
@@ -7004,10 +7304,6 @@
               </a:rPr>
               <a:t>Insert all data into four tables of entities and three tables of relations</a:t>
             </a:r>
-            <a:endParaRPr lang="en-US" altLang="zh-CN" sz="1400">
-              <a:latin typeface="Times New Roman" panose="02020603050405020304" charset="0"/>
-              <a:cs typeface="Times New Roman" panose="02020603050405020304" charset="0"/>
-            </a:endParaRPr>
           </a:p>
           <a:p>
             <a:r>
@@ -7017,10 +7313,6 @@
               </a:rPr>
               <a:t>Create SQL Queries</a:t>
             </a:r>
-            <a:endParaRPr lang="en-US" altLang="zh-CN" sz="1400">
-              <a:latin typeface="Times New Roman" panose="02020603050405020304" charset="0"/>
-              <a:cs typeface="Times New Roman" panose="02020603050405020304" charset="0"/>
-            </a:endParaRPr>
           </a:p>
           <a:p>
             <a:r>
@@ -7030,10 +7322,6 @@
               </a:rPr>
               <a:t>Create Web Application for database </a:t>
             </a:r>
-            <a:endParaRPr lang="en-US" altLang="zh-CN" sz="1400">
-              <a:latin typeface="Times New Roman" panose="02020603050405020304" charset="0"/>
-              <a:cs typeface="Times New Roman" panose="02020603050405020304" charset="0"/>
-            </a:endParaRPr>
           </a:p>
         </p:txBody>
       </p:sp>
@@ -7042,6 +7330,13 @@
   <p:clrMapOvr>
     <a:masterClrMapping/>
   </p:clrMapOvr>
+  <p:timing>
+    <p:tnLst>
+      <p:par>
+        <p:cTn id="1" dur="indefinite" restart="never" nodeType="tmRoot"/>
+      </p:par>
+    </p:tnLst>
+  </p:timing>
 </p:sld>
 </file>
 
@@ -7054,7 +7349,14 @@
         <p:cNvGrpSpPr/>
         <p:nvPr/>
       </p:nvGrpSpPr>
-      <p:grpSpPr/>
+      <p:grpSpPr>
+        <a:xfrm>
+          <a:off x="0" y="0"/>
+          <a:ext cx="0" cy="0"/>
+          <a:chOff x="0" y="0"/>
+          <a:chExt cx="0" cy="0"/>
+        </a:xfrm>
+      </p:grpSpPr>
       <p:sp>
         <p:nvSpPr>
           <p:cNvPr id="2" name="标题 1"/>
@@ -7068,12 +7370,12 @@
         <p:spPr/>
         <p:txBody>
           <a:bodyPr/>
+          <a:lstStyle/>
           <a:p>
             <a:r>
               <a:rPr lang="en-US" altLang="zh-CN"/>
               <a:t>Create Artist Table</a:t>
             </a:r>
-            <a:endParaRPr lang="en-US" altLang="zh-CN"/>
           </a:p>
         </p:txBody>
       </p:sp>
@@ -7090,6 +7392,7 @@
         <p:spPr/>
         <p:txBody>
           <a:bodyPr/>
+          <a:lstStyle/>
           <a:p>
             <a:pPr marL="0" indent="0">
               <a:buNone/>
@@ -7098,7 +7401,6 @@
               <a:rPr lang="zh-CN" altLang="en-US"/>
               <a:t>CREATE TABLE artist</a:t>
             </a:r>
-            <a:endParaRPr lang="zh-CN" altLang="en-US"/>
           </a:p>
           <a:p>
             <a:pPr marL="0" indent="0">
@@ -7108,7 +7410,6 @@
               <a:rPr lang="zh-CN" altLang="en-US"/>
               <a:t>       (aname CHAR(20),</a:t>
             </a:r>
-            <a:endParaRPr lang="zh-CN" altLang="en-US"/>
           </a:p>
           <a:p>
             <a:pPr marL="0" indent="0">
@@ -7118,7 +7419,6 @@
               <a:rPr lang="zh-CN" altLang="en-US"/>
               <a:t>        PRIMARY KEY(aname));</a:t>
             </a:r>
-            <a:endParaRPr lang="zh-CN" altLang="en-US"/>
           </a:p>
         </p:txBody>
       </p:sp>
@@ -7127,6 +7427,13 @@
   <p:clrMapOvr>
     <a:masterClrMapping/>
   </p:clrMapOvr>
+  <p:timing>
+    <p:tnLst>
+      <p:par>
+        <p:cTn id="1" dur="indefinite" restart="never" nodeType="tmRoot"/>
+      </p:par>
+    </p:tnLst>
+  </p:timing>
 </p:sld>
 </file>
 
@@ -7139,7 +7446,14 @@
         <p:cNvGrpSpPr/>
         <p:nvPr/>
       </p:nvGrpSpPr>
-      <p:grpSpPr/>
+      <p:grpSpPr>
+        <a:xfrm>
+          <a:off x="0" y="0"/>
+          <a:ext cx="0" cy="0"/>
+          <a:chOff x="0" y="0"/>
+          <a:chExt cx="0" cy="0"/>
+        </a:xfrm>
+      </p:grpSpPr>
       <p:sp>
         <p:nvSpPr>
           <p:cNvPr id="2" name="标题 1"/>
@@ -7153,12 +7467,12 @@
         <p:spPr/>
         <p:txBody>
           <a:bodyPr/>
+          <a:lstStyle/>
           <a:p>
             <a:r>
               <a:rPr lang="en-US" altLang="zh-CN"/>
               <a:t>Create Album Table</a:t>
             </a:r>
-            <a:endParaRPr lang="en-US" altLang="zh-CN"/>
           </a:p>
         </p:txBody>
       </p:sp>
@@ -7175,6 +7489,7 @@
         <p:spPr/>
         <p:txBody>
           <a:bodyPr/>
+          <a:lstStyle/>
           <a:p>
             <a:pPr marL="0" indent="0">
               <a:buNone/>
@@ -7183,7 +7498,6 @@
               <a:rPr lang="zh-CN" altLang="en-US"/>
               <a:t>CREATE TABLE album</a:t>
             </a:r>
-            <a:endParaRPr lang="zh-CN" altLang="en-US"/>
           </a:p>
           <a:p>
             <a:pPr marL="0" indent="0">
@@ -7193,7 +7507,6 @@
               <a:rPr lang="zh-CN" altLang="en-US"/>
               <a:t>       (abname CHAR(40),</a:t>
             </a:r>
-            <a:endParaRPr lang="zh-CN" altLang="en-US"/>
           </a:p>
           <a:p>
             <a:pPr marL="0" indent="0">
@@ -7203,7 +7516,6 @@
               <a:rPr lang="zh-CN" altLang="en-US"/>
               <a:t>	abtranum INTEGER,</a:t>
             </a:r>
-            <a:endParaRPr lang="zh-CN" altLang="en-US"/>
           </a:p>
           <a:p>
             <a:pPr marL="0" indent="0">
@@ -7213,7 +7525,6 @@
               <a:rPr lang="zh-CN" altLang="en-US"/>
               <a:t>        date DATE, </a:t>
             </a:r>
-            <a:endParaRPr lang="zh-CN" altLang="en-US"/>
           </a:p>
           <a:p>
             <a:pPr marL="0" indent="0">
@@ -7223,7 +7534,6 @@
               <a:rPr lang="zh-CN" altLang="en-US"/>
               <a:t>        PRIMARY KEY (abtranum)</a:t>
             </a:r>
-            <a:endParaRPr lang="zh-CN" altLang="en-US"/>
           </a:p>
           <a:p>
             <a:pPr marL="0" indent="0">
@@ -7233,7 +7543,6 @@
               <a:rPr lang="zh-CN" altLang="en-US"/>
               <a:t>);</a:t>
             </a:r>
-            <a:endParaRPr lang="zh-CN" altLang="en-US"/>
           </a:p>
         </p:txBody>
       </p:sp>
@@ -7242,6 +7551,13 @@
   <p:clrMapOvr>
     <a:masterClrMapping/>
   </p:clrMapOvr>
+  <p:timing>
+    <p:tnLst>
+      <p:par>
+        <p:cTn id="1" dur="indefinite" restart="never" nodeType="tmRoot"/>
+      </p:par>
+    </p:tnLst>
+  </p:timing>
 </p:sld>
 </file>
 
@@ -7254,7 +7570,14 @@
         <p:cNvGrpSpPr/>
         <p:nvPr/>
       </p:nvGrpSpPr>
-      <p:grpSpPr/>
+      <p:grpSpPr>
+        <a:xfrm>
+          <a:off x="0" y="0"/>
+          <a:ext cx="0" cy="0"/>
+          <a:chOff x="0" y="0"/>
+          <a:chExt cx="0" cy="0"/>
+        </a:xfrm>
+      </p:grpSpPr>
       <p:sp>
         <p:nvSpPr>
           <p:cNvPr id="2" name="标题 1"/>
@@ -7268,12 +7591,12 @@
         <p:spPr/>
         <p:txBody>
           <a:bodyPr/>
+          <a:lstStyle/>
           <a:p>
             <a:r>
               <a:rPr lang="en-US" altLang="zh-CN"/>
               <a:t>Create Song Table</a:t>
             </a:r>
-            <a:endParaRPr lang="en-US" altLang="zh-CN"/>
           </a:p>
         </p:txBody>
       </p:sp>
@@ -7292,6 +7615,7 @@
           <a:bodyPr>
             <a:normAutofit lnSpcReduction="10000"/>
           </a:bodyPr>
+          <a:lstStyle/>
           <a:p>
             <a:pPr marL="0" indent="0">
               <a:buNone/>
@@ -7300,7 +7624,6 @@
               <a:rPr lang="zh-CN" altLang="en-US"/>
               <a:t>CREATE TABLE song</a:t>
             </a:r>
-            <a:endParaRPr lang="zh-CN" altLang="en-US"/>
           </a:p>
           <a:p>
             <a:pPr marL="0" indent="0">
@@ -7310,7 +7633,6 @@
               <a:rPr lang="zh-CN" altLang="en-US"/>
               <a:t>       (stranum INTEGER,</a:t>
             </a:r>
-            <a:endParaRPr lang="zh-CN" altLang="en-US"/>
           </a:p>
           <a:p>
             <a:pPr marL="0" indent="0">
@@ -7320,7 +7642,6 @@
               <a:rPr lang="zh-CN" altLang="en-US"/>
               <a:t>	sname CHAR(20),</a:t>
             </a:r>
-            <a:endParaRPr lang="zh-CN" altLang="en-US"/>
           </a:p>
           <a:p>
             <a:pPr marL="0" indent="0">
@@ -7330,7 +7651,6 @@
               <a:rPr lang="zh-CN" altLang="en-US"/>
               <a:t>	abname CHAR(20),</a:t>
             </a:r>
-            <a:endParaRPr lang="zh-CN" altLang="en-US"/>
           </a:p>
           <a:p>
             <a:pPr marL="0" indent="0">
@@ -7340,7 +7660,6 @@
               <a:rPr lang="zh-CN" altLang="en-US"/>
               <a:t>        aname CHAR(20),</a:t>
             </a:r>
-            <a:endParaRPr lang="zh-CN" altLang="en-US"/>
           </a:p>
           <a:p>
             <a:pPr marL="0" indent="0">
@@ -7350,7 +7669,6 @@
               <a:rPr lang="zh-CN" altLang="en-US"/>
               <a:t>        PRIMARY KEY (stranum),</a:t>
             </a:r>
-            <a:endParaRPr lang="zh-CN" altLang="en-US"/>
           </a:p>
           <a:p>
             <a:pPr marL="0" indent="0">
@@ -7360,7 +7678,6 @@
               <a:rPr lang="zh-CN" altLang="en-US"/>
               <a:t>        FOREIGN KEY (aname)</a:t>
             </a:r>
-            <a:endParaRPr lang="zh-CN" altLang="en-US"/>
           </a:p>
           <a:p>
             <a:pPr marL="0" indent="0">
@@ -7370,7 +7687,6 @@
               <a:rPr lang="zh-CN" altLang="en-US"/>
               <a:t>          REFERENCES artist(aname)</a:t>
             </a:r>
-            <a:endParaRPr lang="zh-CN" altLang="en-US"/>
           </a:p>
           <a:p>
             <a:pPr marL="0" indent="0">
@@ -7380,7 +7696,6 @@
               <a:rPr lang="zh-CN" altLang="en-US"/>
               <a:t>);</a:t>
             </a:r>
-            <a:endParaRPr lang="zh-CN" altLang="en-US"/>
           </a:p>
         </p:txBody>
       </p:sp>
@@ -7389,6 +7704,13 @@
   <p:clrMapOvr>
     <a:masterClrMapping/>
   </p:clrMapOvr>
+  <p:timing>
+    <p:tnLst>
+      <p:par>
+        <p:cTn id="1" dur="indefinite" restart="never" nodeType="tmRoot"/>
+      </p:par>
+    </p:tnLst>
+  </p:timing>
 </p:sld>
 </file>
 
@@ -7401,7 +7723,14 @@
         <p:cNvGrpSpPr/>
         <p:nvPr/>
       </p:nvGrpSpPr>
-      <p:grpSpPr/>
+      <p:grpSpPr>
+        <a:xfrm>
+          <a:off x="0" y="0"/>
+          <a:ext cx="0" cy="0"/>
+          <a:chOff x="0" y="0"/>
+          <a:chExt cx="0" cy="0"/>
+        </a:xfrm>
+      </p:grpSpPr>
       <p:sp>
         <p:nvSpPr>
           <p:cNvPr id="2" name="标题 1"/>
@@ -7415,12 +7744,12 @@
         <p:spPr/>
         <p:txBody>
           <a:bodyPr/>
+          <a:lstStyle/>
           <a:p>
             <a:r>
               <a:rPr lang="en-US" altLang="zh-CN"/>
               <a:t>Create Featured_Artist Table</a:t>
             </a:r>
-            <a:endParaRPr lang="en-US" altLang="zh-CN"/>
           </a:p>
         </p:txBody>
       </p:sp>
@@ -7437,6 +7766,7 @@
         <p:spPr/>
         <p:txBody>
           <a:bodyPr/>
+          <a:lstStyle/>
           <a:p>
             <a:pPr marL="0" indent="0">
               <a:buNone/>
@@ -7445,7 +7775,6 @@
               <a:rPr lang="zh-CN" altLang="en-US"/>
               <a:t>CREATE TABLE featured_artist</a:t>
             </a:r>
-            <a:endParaRPr lang="zh-CN" altLang="en-US"/>
           </a:p>
           <a:p>
             <a:pPr marL="0" indent="0">
@@ -7455,7 +7784,6 @@
               <a:rPr lang="zh-CN" altLang="en-US"/>
               <a:t>       (faname CHAR(20),</a:t>
             </a:r>
-            <a:endParaRPr lang="zh-CN" altLang="en-US"/>
           </a:p>
           <a:p>
             <a:pPr marL="0" indent="0">
@@ -7465,7 +7793,6 @@
               <a:rPr lang="zh-CN" altLang="en-US"/>
               <a:t>        PRIMARY KEY (faname));</a:t>
             </a:r>
-            <a:endParaRPr lang="zh-CN" altLang="en-US"/>
           </a:p>
         </p:txBody>
       </p:sp>
@@ -7474,6 +7801,13 @@
   <p:clrMapOvr>
     <a:masterClrMapping/>
   </p:clrMapOvr>
+  <p:timing>
+    <p:tnLst>
+      <p:par>
+        <p:cTn id="1" dur="indefinite" restart="never" nodeType="tmRoot"/>
+      </p:par>
+    </p:tnLst>
+  </p:timing>
 </p:sld>
 </file>
 
@@ -7486,7 +7820,14 @@
         <p:cNvGrpSpPr/>
         <p:nvPr/>
       </p:nvGrpSpPr>
-      <p:grpSpPr/>
+      <p:grpSpPr>
+        <a:xfrm>
+          <a:off x="0" y="0"/>
+          <a:ext cx="0" cy="0"/>
+          <a:chOff x="0" y="0"/>
+          <a:chExt cx="0" cy="0"/>
+        </a:xfrm>
+      </p:grpSpPr>
       <p:sp>
         <p:nvSpPr>
           <p:cNvPr id="2" name="标题 1"/>
@@ -7500,12 +7841,12 @@
         <p:spPr/>
         <p:txBody>
           <a:bodyPr/>
+          <a:lstStyle/>
           <a:p>
             <a:r>
               <a:rPr lang="en-US" altLang="zh-CN"/>
               <a:t>Create Composed_of Table</a:t>
             </a:r>
-            <a:endParaRPr lang="en-US" altLang="zh-CN"/>
           </a:p>
         </p:txBody>
       </p:sp>
@@ -7524,6 +7865,7 @@
           <a:bodyPr>
             <a:normAutofit lnSpcReduction="10000"/>
           </a:bodyPr>
+          <a:lstStyle/>
           <a:p>
             <a:pPr marL="0" indent="0">
               <a:buNone/>
@@ -7532,7 +7874,6 @@
               <a:rPr lang="zh-CN" altLang="en-US"/>
               <a:t>CREATE TABLE composed_of</a:t>
             </a:r>
-            <a:endParaRPr lang="zh-CN" altLang="en-US"/>
           </a:p>
           <a:p>
             <a:pPr marL="0" indent="0">
@@ -7542,7 +7883,6 @@
               <a:rPr lang="zh-CN" altLang="en-US"/>
               <a:t>       (abtranum INTEGER,</a:t>
             </a:r>
-            <a:endParaRPr lang="zh-CN" altLang="en-US"/>
           </a:p>
           <a:p>
             <a:pPr marL="0" indent="0">
@@ -7552,7 +7892,6 @@
               <a:rPr lang="zh-CN" altLang="en-US"/>
               <a:t>        stranum INTEGER,</a:t>
             </a:r>
-            <a:endParaRPr lang="zh-CN" altLang="en-US"/>
           </a:p>
           <a:p>
             <a:pPr marL="0" indent="0">
@@ -7562,7 +7901,6 @@
               <a:rPr lang="zh-CN" altLang="en-US"/>
               <a:t>        PRIMARY KEY (abtranum, stranum),</a:t>
             </a:r>
-            <a:endParaRPr lang="zh-CN" altLang="en-US"/>
           </a:p>
           <a:p>
             <a:pPr marL="0" indent="0">
@@ -7572,7 +7910,6 @@
               <a:rPr lang="zh-CN" altLang="en-US"/>
               <a:t>        FOREIGN KEY (abtranum)</a:t>
             </a:r>
-            <a:endParaRPr lang="zh-CN" altLang="en-US"/>
           </a:p>
           <a:p>
             <a:pPr marL="0" indent="0">
@@ -7582,7 +7919,6 @@
               <a:rPr lang="zh-CN" altLang="en-US"/>
               <a:t>          REFERENCES album (abtranum),</a:t>
             </a:r>
-            <a:endParaRPr lang="zh-CN" altLang="en-US"/>
           </a:p>
           <a:p>
             <a:pPr marL="0" indent="0">
@@ -7592,7 +7928,6 @@
               <a:rPr lang="zh-CN" altLang="en-US"/>
               <a:t>        FOREIGN KEY (stranum)</a:t>
             </a:r>
-            <a:endParaRPr lang="zh-CN" altLang="en-US"/>
           </a:p>
           <a:p>
             <a:pPr marL="0" indent="0">
@@ -7602,7 +7937,6 @@
               <a:rPr lang="zh-CN" altLang="en-US"/>
               <a:t>          REFERENCES song (stranum)</a:t>
             </a:r>
-            <a:endParaRPr lang="zh-CN" altLang="en-US"/>
           </a:p>
           <a:p>
             <a:pPr marL="0" indent="0">
@@ -7612,7 +7946,6 @@
               <a:rPr lang="zh-CN" altLang="en-US"/>
               <a:t>);</a:t>
             </a:r>
-            <a:endParaRPr lang="zh-CN" altLang="en-US"/>
           </a:p>
         </p:txBody>
       </p:sp>
@@ -7621,6 +7954,13 @@
   <p:clrMapOvr>
     <a:masterClrMapping/>
   </p:clrMapOvr>
+  <p:timing>
+    <p:tnLst>
+      <p:par>
+        <p:cTn id="1" dur="indefinite" restart="never" nodeType="tmRoot"/>
+      </p:par>
+    </p:tnLst>
+  </p:timing>
 </p:sld>
 </file>
 
@@ -7875,6 +8215,8 @@
       </a:bgFillStyleLst>
     </a:fmtScheme>
   </a:themeElements>
+  <a:objectDefaults/>
+  <a:extraClrSchemeLst/>
   <a:extLst>
     <a:ext uri="{05A4C25C-085E-4340-85A3-A5531E510DB2}">
       <thm15:themeFamily xmlns:thm15="http://schemas.microsoft.com/office/thememl/2012/main" name="Office Theme" id="{62F939B6-93AF-4DB8-9C6B-D6C7DFDC589F}" vid="{4A3C46E8-61CC-4603-A589-7422A47A8E4A}"/>

</xml_diff>